<commit_message>
updating results in aperture example
</commit_message>
<xml_diff>
--- a/docsrc/_resources/ApertureOpt/Sketch.pptx
+++ b/docsrc/_resources/ApertureOpt/Sketch.pptx
@@ -2,20 +2,21 @@
 <file path=ppt/presentation.xml><?xml version="1.0" encoding="utf-8"?>
 <p:presentation xmlns:a="http://schemas.openxmlformats.org/drawingml/2006/main" xmlns:r="http://schemas.openxmlformats.org/officeDocument/2006/relationships" xmlns:p="http://schemas.openxmlformats.org/presentationml/2006/main" saveSubsetFonts="1">
   <p:sldMasterIdLst>
-    <p:sldMasterId id="2147483648" r:id="rId1"/>
+    <p:sldMasterId id="2147483672" r:id="rId1"/>
   </p:sldMasterIdLst>
   <p:sldIdLst>
     <p:sldId id="256" r:id="rId2"/>
-    <p:sldId id="257" r:id="rId3"/>
-    <p:sldId id="258" r:id="rId4"/>
+    <p:sldId id="259" r:id="rId3"/>
+    <p:sldId id="257" r:id="rId4"/>
+    <p:sldId id="258" r:id="rId5"/>
   </p:sldIdLst>
-  <p:sldSz cx="12192000" cy="6858000"/>
+  <p:sldSz cx="14400213" cy="10799763"/>
   <p:notesSz cx="6858000" cy="9144000"/>
   <p:defaultTextStyle>
     <a:defPPr>
       <a:defRPr lang="en-US"/>
     </a:defPPr>
-    <a:lvl1pPr marL="0" algn="l" defTabSz="914400" rtl="0" eaLnBrk="1" latinLnBrk="0" hangingPunct="1">
+    <a:lvl1pPr marL="0" algn="l" defTabSz="457200" rtl="0" eaLnBrk="1" latinLnBrk="0" hangingPunct="1">
       <a:defRPr sz="1800" kern="1200">
         <a:solidFill>
           <a:schemeClr val="tx1"/>
@@ -25,7 +26,7 @@
         <a:cs typeface="+mn-cs"/>
       </a:defRPr>
     </a:lvl1pPr>
-    <a:lvl2pPr marL="457200" algn="l" defTabSz="914400" rtl="0" eaLnBrk="1" latinLnBrk="0" hangingPunct="1">
+    <a:lvl2pPr marL="457200" algn="l" defTabSz="457200" rtl="0" eaLnBrk="1" latinLnBrk="0" hangingPunct="1">
       <a:defRPr sz="1800" kern="1200">
         <a:solidFill>
           <a:schemeClr val="tx1"/>
@@ -35,7 +36,7 @@
         <a:cs typeface="+mn-cs"/>
       </a:defRPr>
     </a:lvl2pPr>
-    <a:lvl3pPr marL="914400" algn="l" defTabSz="914400" rtl="0" eaLnBrk="1" latinLnBrk="0" hangingPunct="1">
+    <a:lvl3pPr marL="914400" algn="l" defTabSz="457200" rtl="0" eaLnBrk="1" latinLnBrk="0" hangingPunct="1">
       <a:defRPr sz="1800" kern="1200">
         <a:solidFill>
           <a:schemeClr val="tx1"/>
@@ -45,7 +46,7 @@
         <a:cs typeface="+mn-cs"/>
       </a:defRPr>
     </a:lvl3pPr>
-    <a:lvl4pPr marL="1371600" algn="l" defTabSz="914400" rtl="0" eaLnBrk="1" latinLnBrk="0" hangingPunct="1">
+    <a:lvl4pPr marL="1371600" algn="l" defTabSz="457200" rtl="0" eaLnBrk="1" latinLnBrk="0" hangingPunct="1">
       <a:defRPr sz="1800" kern="1200">
         <a:solidFill>
           <a:schemeClr val="tx1"/>
@@ -55,7 +56,7 @@
         <a:cs typeface="+mn-cs"/>
       </a:defRPr>
     </a:lvl4pPr>
-    <a:lvl5pPr marL="1828800" algn="l" defTabSz="914400" rtl="0" eaLnBrk="1" latinLnBrk="0" hangingPunct="1">
+    <a:lvl5pPr marL="1828800" algn="l" defTabSz="457200" rtl="0" eaLnBrk="1" latinLnBrk="0" hangingPunct="1">
       <a:defRPr sz="1800" kern="1200">
         <a:solidFill>
           <a:schemeClr val="tx1"/>
@@ -65,7 +66,7 @@
         <a:cs typeface="+mn-cs"/>
       </a:defRPr>
     </a:lvl5pPr>
-    <a:lvl6pPr marL="2286000" algn="l" defTabSz="914400" rtl="0" eaLnBrk="1" latinLnBrk="0" hangingPunct="1">
+    <a:lvl6pPr marL="2286000" algn="l" defTabSz="457200" rtl="0" eaLnBrk="1" latinLnBrk="0" hangingPunct="1">
       <a:defRPr sz="1800" kern="1200">
         <a:solidFill>
           <a:schemeClr val="tx1"/>
@@ -75,7 +76,7 @@
         <a:cs typeface="+mn-cs"/>
       </a:defRPr>
     </a:lvl6pPr>
-    <a:lvl7pPr marL="2743200" algn="l" defTabSz="914400" rtl="0" eaLnBrk="1" latinLnBrk="0" hangingPunct="1">
+    <a:lvl7pPr marL="2743200" algn="l" defTabSz="457200" rtl="0" eaLnBrk="1" latinLnBrk="0" hangingPunct="1">
       <a:defRPr sz="1800" kern="1200">
         <a:solidFill>
           <a:schemeClr val="tx1"/>
@@ -85,7 +86,7 @@
         <a:cs typeface="+mn-cs"/>
       </a:defRPr>
     </a:lvl7pPr>
-    <a:lvl8pPr marL="3200400" algn="l" defTabSz="914400" rtl="0" eaLnBrk="1" latinLnBrk="0" hangingPunct="1">
+    <a:lvl8pPr marL="3200400" algn="l" defTabSz="457200" rtl="0" eaLnBrk="1" latinLnBrk="0" hangingPunct="1">
       <a:defRPr sz="1800" kern="1200">
         <a:solidFill>
           <a:schemeClr val="tx1"/>
@@ -95,7 +96,7 @@
         <a:cs typeface="+mn-cs"/>
       </a:defRPr>
     </a:lvl8pPr>
-    <a:lvl9pPr marL="3657600" algn="l" defTabSz="914400" rtl="0" eaLnBrk="1" latinLnBrk="0" hangingPunct="1">
+    <a:lvl9pPr marL="3657600" algn="l" defTabSz="457200" rtl="0" eaLnBrk="1" latinLnBrk="0" hangingPunct="1">
       <a:defRPr sz="1800" kern="1200">
         <a:solidFill>
           <a:schemeClr val="tx1"/>
@@ -3365,7 +3366,7 @@
             </a:spcAft>
             <a:buNone/>
           </a:pPr>
-          <a:endParaRPr lang="en-AU" sz="2900" kern="1200"/>
+          <a:endParaRPr lang="en-AU" sz="2900" kern="1200" dirty="0"/>
         </a:p>
       </dsp:txBody>
       <dsp:txXfrm>
@@ -6547,13 +6548,7 @@
       </p:grpSpPr>
       <p:sp>
         <p:nvSpPr>
-          <p:cNvPr id="2" name="Title 1">
-            <a:extLst>
-              <a:ext uri="{FF2B5EF4-FFF2-40B4-BE49-F238E27FC236}">
-                <a16:creationId xmlns:a16="http://schemas.microsoft.com/office/drawing/2014/main" id="{E6499E5A-9543-46D6-9A40-28E10A528EEC}"/>
-              </a:ext>
-            </a:extLst>
-          </p:cNvPr>
+          <p:cNvPr id="2" name="Title 1"/>
           <p:cNvSpPr>
             <a:spLocks noGrp="1"/>
           </p:cNvSpPr>
@@ -6563,15 +6558,15 @@
         </p:nvSpPr>
         <p:spPr>
           <a:xfrm>
-            <a:off x="1524000" y="1122363"/>
-            <a:ext cx="9144000" cy="2387600"/>
+            <a:off x="1080016" y="1767462"/>
+            <a:ext cx="12240181" cy="3759917"/>
           </a:xfrm>
         </p:spPr>
         <p:txBody>
           <a:bodyPr anchor="b"/>
           <a:lstStyle>
             <a:lvl1pPr algn="ctr">
-              <a:defRPr sz="6000"/>
+              <a:defRPr sz="9449"/>
             </a:lvl1pPr>
           </a:lstStyle>
           <a:p>
@@ -6579,19 +6574,13 @@
               <a:rPr lang="en-US"/>
               <a:t>Click to edit Master title style</a:t>
             </a:r>
-            <a:endParaRPr lang="en-AU"/>
+            <a:endParaRPr lang="en-US" dirty="0"/>
           </a:p>
         </p:txBody>
       </p:sp>
       <p:sp>
         <p:nvSpPr>
-          <p:cNvPr id="3" name="Subtitle 2">
-            <a:extLst>
-              <a:ext uri="{FF2B5EF4-FFF2-40B4-BE49-F238E27FC236}">
-                <a16:creationId xmlns:a16="http://schemas.microsoft.com/office/drawing/2014/main" id="{94EFA4ED-D949-48C6-A4CA-937B4A2104E4}"/>
-              </a:ext>
-            </a:extLst>
-          </p:cNvPr>
+          <p:cNvPr id="3" name="Subtitle 2"/>
           <p:cNvSpPr>
             <a:spLocks noGrp="1"/>
           </p:cNvSpPr>
@@ -6601,8 +6590,8 @@
         </p:nvSpPr>
         <p:spPr>
           <a:xfrm>
-            <a:off x="1524000" y="3602038"/>
-            <a:ext cx="9144000" cy="1655762"/>
+            <a:off x="1800027" y="5672376"/>
+            <a:ext cx="10800160" cy="2607442"/>
           </a:xfrm>
         </p:spPr>
         <p:txBody>
@@ -6610,39 +6599,39 @@
           <a:lstStyle>
             <a:lvl1pPr marL="0" indent="0" algn="ctr">
               <a:buNone/>
-              <a:defRPr sz="2400"/>
+              <a:defRPr sz="3780"/>
             </a:lvl1pPr>
-            <a:lvl2pPr marL="457200" indent="0" algn="ctr">
+            <a:lvl2pPr marL="719999" indent="0" algn="ctr">
               <a:buNone/>
-              <a:defRPr sz="2000"/>
+              <a:defRPr sz="3150"/>
             </a:lvl2pPr>
-            <a:lvl3pPr marL="914400" indent="0" algn="ctr">
+            <a:lvl3pPr marL="1439997" indent="0" algn="ctr">
               <a:buNone/>
-              <a:defRPr sz="1800"/>
+              <a:defRPr sz="2835"/>
             </a:lvl3pPr>
-            <a:lvl4pPr marL="1371600" indent="0" algn="ctr">
+            <a:lvl4pPr marL="2159996" indent="0" algn="ctr">
               <a:buNone/>
-              <a:defRPr sz="1600"/>
+              <a:defRPr sz="2520"/>
             </a:lvl4pPr>
-            <a:lvl5pPr marL="1828800" indent="0" algn="ctr">
+            <a:lvl5pPr marL="2879994" indent="0" algn="ctr">
               <a:buNone/>
-              <a:defRPr sz="1600"/>
+              <a:defRPr sz="2520"/>
             </a:lvl5pPr>
-            <a:lvl6pPr marL="2286000" indent="0" algn="ctr">
+            <a:lvl6pPr marL="3599993" indent="0" algn="ctr">
               <a:buNone/>
-              <a:defRPr sz="1600"/>
+              <a:defRPr sz="2520"/>
             </a:lvl6pPr>
-            <a:lvl7pPr marL="2743200" indent="0" algn="ctr">
+            <a:lvl7pPr marL="4319991" indent="0" algn="ctr">
               <a:buNone/>
-              <a:defRPr sz="1600"/>
+              <a:defRPr sz="2520"/>
             </a:lvl7pPr>
-            <a:lvl8pPr marL="3200400" indent="0" algn="ctr">
+            <a:lvl8pPr marL="5039990" indent="0" algn="ctr">
               <a:buNone/>
-              <a:defRPr sz="1600"/>
+              <a:defRPr sz="2520"/>
             </a:lvl8pPr>
-            <a:lvl9pPr marL="3657600" indent="0" algn="ctr">
+            <a:lvl9pPr marL="5759988" indent="0" algn="ctr">
               <a:buNone/>
-              <a:defRPr sz="1600"/>
+              <a:defRPr sz="2520"/>
             </a:lvl9pPr>
           </a:lstStyle>
           <a:p>
@@ -6650,19 +6639,13 @@
               <a:rPr lang="en-US"/>
               <a:t>Click to edit Master subtitle style</a:t>
             </a:r>
-            <a:endParaRPr lang="en-AU"/>
+            <a:endParaRPr lang="en-US" dirty="0"/>
           </a:p>
         </p:txBody>
       </p:sp>
       <p:sp>
         <p:nvSpPr>
-          <p:cNvPr id="4" name="Date Placeholder 3">
-            <a:extLst>
-              <a:ext uri="{FF2B5EF4-FFF2-40B4-BE49-F238E27FC236}">
-                <a16:creationId xmlns:a16="http://schemas.microsoft.com/office/drawing/2014/main" id="{D8EB36A4-5991-4C4F-8489-2247707F907E}"/>
-              </a:ext>
-            </a:extLst>
-          </p:cNvPr>
+          <p:cNvPr id="4" name="Date Placeholder 3"/>
           <p:cNvSpPr>
             <a:spLocks noGrp="1"/>
           </p:cNvSpPr>
@@ -6677,7 +6660,7 @@
           <a:p>
             <a:fld id="{85C9B555-08B4-40A8-BBAB-879833AA5A7D}" type="datetimeFigureOut">
               <a:rPr lang="en-AU" smtClean="0"/>
-              <a:t>4/02/2022</a:t>
+              <a:t>24/02/2022</a:t>
             </a:fld>
             <a:endParaRPr lang="en-AU"/>
           </a:p>
@@ -6685,13 +6668,7 @@
       </p:sp>
       <p:sp>
         <p:nvSpPr>
-          <p:cNvPr id="5" name="Footer Placeholder 4">
-            <a:extLst>
-              <a:ext uri="{FF2B5EF4-FFF2-40B4-BE49-F238E27FC236}">
-                <a16:creationId xmlns:a16="http://schemas.microsoft.com/office/drawing/2014/main" id="{C67DFEE0-C7BC-43B0-976C-DE415723ACA3}"/>
-              </a:ext>
-            </a:extLst>
-          </p:cNvPr>
+          <p:cNvPr id="5" name="Footer Placeholder 4"/>
           <p:cNvSpPr>
             <a:spLocks noGrp="1"/>
           </p:cNvSpPr>
@@ -6710,13 +6687,7 @@
       </p:sp>
       <p:sp>
         <p:nvSpPr>
-          <p:cNvPr id="6" name="Slide Number Placeholder 5">
-            <a:extLst>
-              <a:ext uri="{FF2B5EF4-FFF2-40B4-BE49-F238E27FC236}">
-                <a16:creationId xmlns:a16="http://schemas.microsoft.com/office/drawing/2014/main" id="{1C19C70F-9325-4982-93B3-252C8ED3C9B0}"/>
-              </a:ext>
-            </a:extLst>
-          </p:cNvPr>
+          <p:cNvPr id="6" name="Slide Number Placeholder 5"/>
           <p:cNvSpPr>
             <a:spLocks noGrp="1"/>
           </p:cNvSpPr>
@@ -6740,7 +6711,7 @@
     </p:spTree>
     <p:extLst>
       <p:ext uri="{BB962C8B-B14F-4D97-AF65-F5344CB8AC3E}">
-        <p14:creationId xmlns:p14="http://schemas.microsoft.com/office/powerpoint/2010/main" val="2250625047"/>
+        <p14:creationId xmlns:p14="http://schemas.microsoft.com/office/powerpoint/2010/main" val="410491352"/>
       </p:ext>
     </p:extLst>
   </p:cSld>
@@ -6769,13 +6740,7 @@
       </p:grpSpPr>
       <p:sp>
         <p:nvSpPr>
-          <p:cNvPr id="2" name="Title 1">
-            <a:extLst>
-              <a:ext uri="{FF2B5EF4-FFF2-40B4-BE49-F238E27FC236}">
-                <a16:creationId xmlns:a16="http://schemas.microsoft.com/office/drawing/2014/main" id="{C651195B-F80C-4FB3-8DB6-1EA4B2E5A978}"/>
-              </a:ext>
-            </a:extLst>
-          </p:cNvPr>
+          <p:cNvPr id="2" name="Title 1"/>
           <p:cNvSpPr>
             <a:spLocks noGrp="1"/>
           </p:cNvSpPr>
@@ -6792,19 +6757,13 @@
               <a:rPr lang="en-US"/>
               <a:t>Click to edit Master title style</a:t>
             </a:r>
-            <a:endParaRPr lang="en-AU"/>
+            <a:endParaRPr lang="en-US" dirty="0"/>
           </a:p>
         </p:txBody>
       </p:sp>
       <p:sp>
         <p:nvSpPr>
-          <p:cNvPr id="3" name="Vertical Text Placeholder 2">
-            <a:extLst>
-              <a:ext uri="{FF2B5EF4-FFF2-40B4-BE49-F238E27FC236}">
-                <a16:creationId xmlns:a16="http://schemas.microsoft.com/office/drawing/2014/main" id="{9FBA96D9-F1F9-41C6-B1FC-C7CF6F980E1E}"/>
-              </a:ext>
-            </a:extLst>
-          </p:cNvPr>
+          <p:cNvPr id="3" name="Vertical Text Placeholder 2"/>
           <p:cNvSpPr>
             <a:spLocks noGrp="1"/>
           </p:cNvSpPr>
@@ -6850,19 +6809,13 @@
               <a:rPr lang="en-US"/>
               <a:t>Fifth level</a:t>
             </a:r>
-            <a:endParaRPr lang="en-AU"/>
+            <a:endParaRPr lang="en-US" dirty="0"/>
           </a:p>
         </p:txBody>
       </p:sp>
       <p:sp>
         <p:nvSpPr>
-          <p:cNvPr id="4" name="Date Placeholder 3">
-            <a:extLst>
-              <a:ext uri="{FF2B5EF4-FFF2-40B4-BE49-F238E27FC236}">
-                <a16:creationId xmlns:a16="http://schemas.microsoft.com/office/drawing/2014/main" id="{E1F78980-782D-4CB9-8710-8314B62D66BB}"/>
-              </a:ext>
-            </a:extLst>
-          </p:cNvPr>
+          <p:cNvPr id="4" name="Date Placeholder 3"/>
           <p:cNvSpPr>
             <a:spLocks noGrp="1"/>
           </p:cNvSpPr>
@@ -6877,7 +6830,7 @@
           <a:p>
             <a:fld id="{85C9B555-08B4-40A8-BBAB-879833AA5A7D}" type="datetimeFigureOut">
               <a:rPr lang="en-AU" smtClean="0"/>
-              <a:t>4/02/2022</a:t>
+              <a:t>24/02/2022</a:t>
             </a:fld>
             <a:endParaRPr lang="en-AU"/>
           </a:p>
@@ -6885,13 +6838,7 @@
       </p:sp>
       <p:sp>
         <p:nvSpPr>
-          <p:cNvPr id="5" name="Footer Placeholder 4">
-            <a:extLst>
-              <a:ext uri="{FF2B5EF4-FFF2-40B4-BE49-F238E27FC236}">
-                <a16:creationId xmlns:a16="http://schemas.microsoft.com/office/drawing/2014/main" id="{28C085B8-C9EE-4C9C-BC60-B22022DC82DD}"/>
-              </a:ext>
-            </a:extLst>
-          </p:cNvPr>
+          <p:cNvPr id="5" name="Footer Placeholder 4"/>
           <p:cNvSpPr>
             <a:spLocks noGrp="1"/>
           </p:cNvSpPr>
@@ -6910,13 +6857,7 @@
       </p:sp>
       <p:sp>
         <p:nvSpPr>
-          <p:cNvPr id="6" name="Slide Number Placeholder 5">
-            <a:extLst>
-              <a:ext uri="{FF2B5EF4-FFF2-40B4-BE49-F238E27FC236}">
-                <a16:creationId xmlns:a16="http://schemas.microsoft.com/office/drawing/2014/main" id="{4B0E12B6-5D68-4C9C-8DBA-8EB4FC6DA461}"/>
-              </a:ext>
-            </a:extLst>
-          </p:cNvPr>
+          <p:cNvPr id="6" name="Slide Number Placeholder 5"/>
           <p:cNvSpPr>
             <a:spLocks noGrp="1"/>
           </p:cNvSpPr>
@@ -6940,7 +6881,7 @@
     </p:spTree>
     <p:extLst>
       <p:ext uri="{BB962C8B-B14F-4D97-AF65-F5344CB8AC3E}">
-        <p14:creationId xmlns:p14="http://schemas.microsoft.com/office/powerpoint/2010/main" val="1869806627"/>
+        <p14:creationId xmlns:p14="http://schemas.microsoft.com/office/powerpoint/2010/main" val="1755479244"/>
       </p:ext>
     </p:extLst>
   </p:cSld>
@@ -6969,13 +6910,7 @@
       </p:grpSpPr>
       <p:sp>
         <p:nvSpPr>
-          <p:cNvPr id="2" name="Vertical Title 1">
-            <a:extLst>
-              <a:ext uri="{FF2B5EF4-FFF2-40B4-BE49-F238E27FC236}">
-                <a16:creationId xmlns:a16="http://schemas.microsoft.com/office/drawing/2014/main" id="{3F291EFB-7EBD-4F3A-A444-7C50F31E99FB}"/>
-              </a:ext>
-            </a:extLst>
-          </p:cNvPr>
+          <p:cNvPr id="2" name="Vertical Title 1"/>
           <p:cNvSpPr>
             <a:spLocks noGrp="1"/>
           </p:cNvSpPr>
@@ -6985,8 +6920,8 @@
         </p:nvSpPr>
         <p:spPr>
           <a:xfrm>
-            <a:off x="8724900" y="365125"/>
-            <a:ext cx="2628900" cy="5811838"/>
+            <a:off x="10305153" y="574987"/>
+            <a:ext cx="3105046" cy="9152300"/>
           </a:xfrm>
         </p:spPr>
         <p:txBody>
@@ -6997,19 +6932,13 @@
               <a:rPr lang="en-US"/>
               <a:t>Click to edit Master title style</a:t>
             </a:r>
-            <a:endParaRPr lang="en-AU"/>
+            <a:endParaRPr lang="en-US" dirty="0"/>
           </a:p>
         </p:txBody>
       </p:sp>
       <p:sp>
         <p:nvSpPr>
-          <p:cNvPr id="3" name="Vertical Text Placeholder 2">
-            <a:extLst>
-              <a:ext uri="{FF2B5EF4-FFF2-40B4-BE49-F238E27FC236}">
-                <a16:creationId xmlns:a16="http://schemas.microsoft.com/office/drawing/2014/main" id="{BDC8947F-2AAC-43CC-B920-C3B8E5D7FFAA}"/>
-              </a:ext>
-            </a:extLst>
-          </p:cNvPr>
+          <p:cNvPr id="3" name="Vertical Text Placeholder 2"/>
           <p:cNvSpPr>
             <a:spLocks noGrp="1"/>
           </p:cNvSpPr>
@@ -7019,8 +6948,8 @@
         </p:nvSpPr>
         <p:spPr>
           <a:xfrm>
-            <a:off x="838200" y="365125"/>
-            <a:ext cx="7734300" cy="5811838"/>
+            <a:off x="990015" y="574987"/>
+            <a:ext cx="9135135" cy="9152300"/>
           </a:xfrm>
         </p:spPr>
         <p:txBody>
@@ -7060,19 +6989,13 @@
               <a:rPr lang="en-US"/>
               <a:t>Fifth level</a:t>
             </a:r>
-            <a:endParaRPr lang="en-AU"/>
+            <a:endParaRPr lang="en-US" dirty="0"/>
           </a:p>
         </p:txBody>
       </p:sp>
       <p:sp>
         <p:nvSpPr>
-          <p:cNvPr id="4" name="Date Placeholder 3">
-            <a:extLst>
-              <a:ext uri="{FF2B5EF4-FFF2-40B4-BE49-F238E27FC236}">
-                <a16:creationId xmlns:a16="http://schemas.microsoft.com/office/drawing/2014/main" id="{98ECDF90-8E26-42DF-87DC-3BDDF92698B5}"/>
-              </a:ext>
-            </a:extLst>
-          </p:cNvPr>
+          <p:cNvPr id="4" name="Date Placeholder 3"/>
           <p:cNvSpPr>
             <a:spLocks noGrp="1"/>
           </p:cNvSpPr>
@@ -7087,7 +7010,7 @@
           <a:p>
             <a:fld id="{85C9B555-08B4-40A8-BBAB-879833AA5A7D}" type="datetimeFigureOut">
               <a:rPr lang="en-AU" smtClean="0"/>
-              <a:t>4/02/2022</a:t>
+              <a:t>24/02/2022</a:t>
             </a:fld>
             <a:endParaRPr lang="en-AU"/>
           </a:p>
@@ -7095,13 +7018,7 @@
       </p:sp>
       <p:sp>
         <p:nvSpPr>
-          <p:cNvPr id="5" name="Footer Placeholder 4">
-            <a:extLst>
-              <a:ext uri="{FF2B5EF4-FFF2-40B4-BE49-F238E27FC236}">
-                <a16:creationId xmlns:a16="http://schemas.microsoft.com/office/drawing/2014/main" id="{038B4B64-BB61-4A11-823D-864414CD6567}"/>
-              </a:ext>
-            </a:extLst>
-          </p:cNvPr>
+          <p:cNvPr id="5" name="Footer Placeholder 4"/>
           <p:cNvSpPr>
             <a:spLocks noGrp="1"/>
           </p:cNvSpPr>
@@ -7120,13 +7037,7 @@
       </p:sp>
       <p:sp>
         <p:nvSpPr>
-          <p:cNvPr id="6" name="Slide Number Placeholder 5">
-            <a:extLst>
-              <a:ext uri="{FF2B5EF4-FFF2-40B4-BE49-F238E27FC236}">
-                <a16:creationId xmlns:a16="http://schemas.microsoft.com/office/drawing/2014/main" id="{3EB35087-88F2-40B6-8552-056072FEFF59}"/>
-              </a:ext>
-            </a:extLst>
-          </p:cNvPr>
+          <p:cNvPr id="6" name="Slide Number Placeholder 5"/>
           <p:cNvSpPr>
             <a:spLocks noGrp="1"/>
           </p:cNvSpPr>
@@ -7150,7 +7061,7 @@
     </p:spTree>
     <p:extLst>
       <p:ext uri="{BB962C8B-B14F-4D97-AF65-F5344CB8AC3E}">
-        <p14:creationId xmlns:p14="http://schemas.microsoft.com/office/powerpoint/2010/main" val="2242725652"/>
+        <p14:creationId xmlns:p14="http://schemas.microsoft.com/office/powerpoint/2010/main" val="3419277116"/>
       </p:ext>
     </p:extLst>
   </p:cSld>
@@ -7179,13 +7090,7 @@
       </p:grpSpPr>
       <p:sp>
         <p:nvSpPr>
-          <p:cNvPr id="2" name="Title 1">
-            <a:extLst>
-              <a:ext uri="{FF2B5EF4-FFF2-40B4-BE49-F238E27FC236}">
-                <a16:creationId xmlns:a16="http://schemas.microsoft.com/office/drawing/2014/main" id="{AC292679-21A0-4A75-9238-EE75952009BB}"/>
-              </a:ext>
-            </a:extLst>
-          </p:cNvPr>
+          <p:cNvPr id="2" name="Title 1"/>
           <p:cNvSpPr>
             <a:spLocks noGrp="1"/>
           </p:cNvSpPr>
@@ -7202,19 +7107,13 @@
               <a:rPr lang="en-US"/>
               <a:t>Click to edit Master title style</a:t>
             </a:r>
-            <a:endParaRPr lang="en-AU"/>
+            <a:endParaRPr lang="en-US" dirty="0"/>
           </a:p>
         </p:txBody>
       </p:sp>
       <p:sp>
         <p:nvSpPr>
-          <p:cNvPr id="3" name="Content Placeholder 2">
-            <a:extLst>
-              <a:ext uri="{FF2B5EF4-FFF2-40B4-BE49-F238E27FC236}">
-                <a16:creationId xmlns:a16="http://schemas.microsoft.com/office/drawing/2014/main" id="{A84503B2-FFB5-4139-A95D-F9B820AA93F4}"/>
-              </a:ext>
-            </a:extLst>
-          </p:cNvPr>
+          <p:cNvPr id="3" name="Content Placeholder 2"/>
           <p:cNvSpPr>
             <a:spLocks noGrp="1"/>
           </p:cNvSpPr>
@@ -7260,19 +7159,13 @@
               <a:rPr lang="en-US"/>
               <a:t>Fifth level</a:t>
             </a:r>
-            <a:endParaRPr lang="en-AU"/>
+            <a:endParaRPr lang="en-US" dirty="0"/>
           </a:p>
         </p:txBody>
       </p:sp>
       <p:sp>
         <p:nvSpPr>
-          <p:cNvPr id="4" name="Date Placeholder 3">
-            <a:extLst>
-              <a:ext uri="{FF2B5EF4-FFF2-40B4-BE49-F238E27FC236}">
-                <a16:creationId xmlns:a16="http://schemas.microsoft.com/office/drawing/2014/main" id="{00BA82C2-A99A-4ED9-9042-157F85EED1C3}"/>
-              </a:ext>
-            </a:extLst>
-          </p:cNvPr>
+          <p:cNvPr id="4" name="Date Placeholder 3"/>
           <p:cNvSpPr>
             <a:spLocks noGrp="1"/>
           </p:cNvSpPr>
@@ -7287,7 +7180,7 @@
           <a:p>
             <a:fld id="{85C9B555-08B4-40A8-BBAB-879833AA5A7D}" type="datetimeFigureOut">
               <a:rPr lang="en-AU" smtClean="0"/>
-              <a:t>4/02/2022</a:t>
+              <a:t>24/02/2022</a:t>
             </a:fld>
             <a:endParaRPr lang="en-AU"/>
           </a:p>
@@ -7295,13 +7188,7 @@
       </p:sp>
       <p:sp>
         <p:nvSpPr>
-          <p:cNvPr id="5" name="Footer Placeholder 4">
-            <a:extLst>
-              <a:ext uri="{FF2B5EF4-FFF2-40B4-BE49-F238E27FC236}">
-                <a16:creationId xmlns:a16="http://schemas.microsoft.com/office/drawing/2014/main" id="{D4F64F97-AA64-4A80-9331-7A1F32D1D7C4}"/>
-              </a:ext>
-            </a:extLst>
-          </p:cNvPr>
+          <p:cNvPr id="5" name="Footer Placeholder 4"/>
           <p:cNvSpPr>
             <a:spLocks noGrp="1"/>
           </p:cNvSpPr>
@@ -7320,13 +7207,7 @@
       </p:sp>
       <p:sp>
         <p:nvSpPr>
-          <p:cNvPr id="6" name="Slide Number Placeholder 5">
-            <a:extLst>
-              <a:ext uri="{FF2B5EF4-FFF2-40B4-BE49-F238E27FC236}">
-                <a16:creationId xmlns:a16="http://schemas.microsoft.com/office/drawing/2014/main" id="{237C41DA-ED60-4AB6-BA0C-39B17C16AA7C}"/>
-              </a:ext>
-            </a:extLst>
-          </p:cNvPr>
+          <p:cNvPr id="6" name="Slide Number Placeholder 5"/>
           <p:cNvSpPr>
             <a:spLocks noGrp="1"/>
           </p:cNvSpPr>
@@ -7350,7 +7231,7 @@
     </p:spTree>
     <p:extLst>
       <p:ext uri="{BB962C8B-B14F-4D97-AF65-F5344CB8AC3E}">
-        <p14:creationId xmlns:p14="http://schemas.microsoft.com/office/powerpoint/2010/main" val="928932407"/>
+        <p14:creationId xmlns:p14="http://schemas.microsoft.com/office/powerpoint/2010/main" val="3713487331"/>
       </p:ext>
     </p:extLst>
   </p:cSld>
@@ -7379,13 +7260,7 @@
       </p:grpSpPr>
       <p:sp>
         <p:nvSpPr>
-          <p:cNvPr id="2" name="Title 1">
-            <a:extLst>
-              <a:ext uri="{FF2B5EF4-FFF2-40B4-BE49-F238E27FC236}">
-                <a16:creationId xmlns:a16="http://schemas.microsoft.com/office/drawing/2014/main" id="{BD2E47BB-456D-45E9-961A-9519763B33A6}"/>
-              </a:ext>
-            </a:extLst>
-          </p:cNvPr>
+          <p:cNvPr id="2" name="Title 1"/>
           <p:cNvSpPr>
             <a:spLocks noGrp="1"/>
           </p:cNvSpPr>
@@ -7395,15 +7270,15 @@
         </p:nvSpPr>
         <p:spPr>
           <a:xfrm>
-            <a:off x="831850" y="1709738"/>
-            <a:ext cx="10515600" cy="2852737"/>
+            <a:off x="982515" y="2692444"/>
+            <a:ext cx="12420184" cy="4492401"/>
           </a:xfrm>
         </p:spPr>
         <p:txBody>
           <a:bodyPr anchor="b"/>
           <a:lstStyle>
             <a:lvl1pPr>
-              <a:defRPr sz="6000"/>
+              <a:defRPr sz="9449"/>
             </a:lvl1pPr>
           </a:lstStyle>
           <a:p>
@@ -7411,19 +7286,13 @@
               <a:rPr lang="en-US"/>
               <a:t>Click to edit Master title style</a:t>
             </a:r>
-            <a:endParaRPr lang="en-AU"/>
+            <a:endParaRPr lang="en-US" dirty="0"/>
           </a:p>
         </p:txBody>
       </p:sp>
       <p:sp>
         <p:nvSpPr>
-          <p:cNvPr id="3" name="Text Placeholder 2">
-            <a:extLst>
-              <a:ext uri="{FF2B5EF4-FFF2-40B4-BE49-F238E27FC236}">
-                <a16:creationId xmlns:a16="http://schemas.microsoft.com/office/drawing/2014/main" id="{545A98AF-EC1B-4183-AAFA-DDE588F3C9D0}"/>
-              </a:ext>
-            </a:extLst>
-          </p:cNvPr>
+          <p:cNvPr id="3" name="Text Placeholder 2"/>
           <p:cNvSpPr>
             <a:spLocks noGrp="1"/>
           </p:cNvSpPr>
@@ -7433,8 +7302,8 @@
         </p:nvSpPr>
         <p:spPr>
           <a:xfrm>
-            <a:off x="831850" y="4589463"/>
-            <a:ext cx="10515600" cy="1500187"/>
+            <a:off x="982515" y="7227345"/>
+            <a:ext cx="12420184" cy="2362447"/>
           </a:xfrm>
         </p:spPr>
         <p:txBody>
@@ -7442,17 +7311,15 @@
           <a:lstStyle>
             <a:lvl1pPr marL="0" indent="0">
               <a:buNone/>
-              <a:defRPr sz="2400">
+              <a:defRPr sz="3780">
                 <a:solidFill>
-                  <a:schemeClr val="tx1">
-                    <a:tint val="75000"/>
-                  </a:schemeClr>
+                  <a:schemeClr val="tx1"/>
                 </a:solidFill>
               </a:defRPr>
             </a:lvl1pPr>
-            <a:lvl2pPr marL="457200" indent="0">
+            <a:lvl2pPr marL="719999" indent="0">
               <a:buNone/>
-              <a:defRPr sz="2000">
+              <a:defRPr sz="3150">
                 <a:solidFill>
                   <a:schemeClr val="tx1">
                     <a:tint val="75000"/>
@@ -7460,9 +7327,9 @@
                 </a:solidFill>
               </a:defRPr>
             </a:lvl2pPr>
-            <a:lvl3pPr marL="914400" indent="0">
+            <a:lvl3pPr marL="1439997" indent="0">
               <a:buNone/>
-              <a:defRPr sz="1800">
+              <a:defRPr sz="2835">
                 <a:solidFill>
                   <a:schemeClr val="tx1">
                     <a:tint val="75000"/>
@@ -7470,9 +7337,9 @@
                 </a:solidFill>
               </a:defRPr>
             </a:lvl3pPr>
-            <a:lvl4pPr marL="1371600" indent="0">
+            <a:lvl4pPr marL="2159996" indent="0">
               <a:buNone/>
-              <a:defRPr sz="1600">
+              <a:defRPr sz="2520">
                 <a:solidFill>
                   <a:schemeClr val="tx1">
                     <a:tint val="75000"/>
@@ -7480,9 +7347,9 @@
                 </a:solidFill>
               </a:defRPr>
             </a:lvl4pPr>
-            <a:lvl5pPr marL="1828800" indent="0">
+            <a:lvl5pPr marL="2879994" indent="0">
               <a:buNone/>
-              <a:defRPr sz="1600">
+              <a:defRPr sz="2520">
                 <a:solidFill>
                   <a:schemeClr val="tx1">
                     <a:tint val="75000"/>
@@ -7490,9 +7357,9 @@
                 </a:solidFill>
               </a:defRPr>
             </a:lvl5pPr>
-            <a:lvl6pPr marL="2286000" indent="0">
+            <a:lvl6pPr marL="3599993" indent="0">
               <a:buNone/>
-              <a:defRPr sz="1600">
+              <a:defRPr sz="2520">
                 <a:solidFill>
                   <a:schemeClr val="tx1">
                     <a:tint val="75000"/>
@@ -7500,9 +7367,9 @@
                 </a:solidFill>
               </a:defRPr>
             </a:lvl6pPr>
-            <a:lvl7pPr marL="2743200" indent="0">
+            <a:lvl7pPr marL="4319991" indent="0">
               <a:buNone/>
-              <a:defRPr sz="1600">
+              <a:defRPr sz="2520">
                 <a:solidFill>
                   <a:schemeClr val="tx1">
                     <a:tint val="75000"/>
@@ -7510,9 +7377,9 @@
                 </a:solidFill>
               </a:defRPr>
             </a:lvl7pPr>
-            <a:lvl8pPr marL="3200400" indent="0">
+            <a:lvl8pPr marL="5039990" indent="0">
               <a:buNone/>
-              <a:defRPr sz="1600">
+              <a:defRPr sz="2520">
                 <a:solidFill>
                   <a:schemeClr val="tx1">
                     <a:tint val="75000"/>
@@ -7520,9 +7387,9 @@
                 </a:solidFill>
               </a:defRPr>
             </a:lvl8pPr>
-            <a:lvl9pPr marL="3657600" indent="0">
+            <a:lvl9pPr marL="5759988" indent="0">
               <a:buNone/>
-              <a:defRPr sz="1600">
+              <a:defRPr sz="2520">
                 <a:solidFill>
                   <a:schemeClr val="tx1">
                     <a:tint val="75000"/>
@@ -7542,13 +7409,7 @@
       </p:sp>
       <p:sp>
         <p:nvSpPr>
-          <p:cNvPr id="4" name="Date Placeholder 3">
-            <a:extLst>
-              <a:ext uri="{FF2B5EF4-FFF2-40B4-BE49-F238E27FC236}">
-                <a16:creationId xmlns:a16="http://schemas.microsoft.com/office/drawing/2014/main" id="{3D25AF63-058E-4EA9-A4A4-0EF883732738}"/>
-              </a:ext>
-            </a:extLst>
-          </p:cNvPr>
+          <p:cNvPr id="4" name="Date Placeholder 3"/>
           <p:cNvSpPr>
             <a:spLocks noGrp="1"/>
           </p:cNvSpPr>
@@ -7563,7 +7424,7 @@
           <a:p>
             <a:fld id="{85C9B555-08B4-40A8-BBAB-879833AA5A7D}" type="datetimeFigureOut">
               <a:rPr lang="en-AU" smtClean="0"/>
-              <a:t>4/02/2022</a:t>
+              <a:t>24/02/2022</a:t>
             </a:fld>
             <a:endParaRPr lang="en-AU"/>
           </a:p>
@@ -7571,13 +7432,7 @@
       </p:sp>
       <p:sp>
         <p:nvSpPr>
-          <p:cNvPr id="5" name="Footer Placeholder 4">
-            <a:extLst>
-              <a:ext uri="{FF2B5EF4-FFF2-40B4-BE49-F238E27FC236}">
-                <a16:creationId xmlns:a16="http://schemas.microsoft.com/office/drawing/2014/main" id="{E640AD3A-EB62-4270-9795-28F4BE63471C}"/>
-              </a:ext>
-            </a:extLst>
-          </p:cNvPr>
+          <p:cNvPr id="5" name="Footer Placeholder 4"/>
           <p:cNvSpPr>
             <a:spLocks noGrp="1"/>
           </p:cNvSpPr>
@@ -7596,13 +7451,7 @@
       </p:sp>
       <p:sp>
         <p:nvSpPr>
-          <p:cNvPr id="6" name="Slide Number Placeholder 5">
-            <a:extLst>
-              <a:ext uri="{FF2B5EF4-FFF2-40B4-BE49-F238E27FC236}">
-                <a16:creationId xmlns:a16="http://schemas.microsoft.com/office/drawing/2014/main" id="{B3358CBF-6BB3-4E1E-9195-077C9571005E}"/>
-              </a:ext>
-            </a:extLst>
-          </p:cNvPr>
+          <p:cNvPr id="6" name="Slide Number Placeholder 5"/>
           <p:cNvSpPr>
             <a:spLocks noGrp="1"/>
           </p:cNvSpPr>
@@ -7626,7 +7475,7 @@
     </p:spTree>
     <p:extLst>
       <p:ext uri="{BB962C8B-B14F-4D97-AF65-F5344CB8AC3E}">
-        <p14:creationId xmlns:p14="http://schemas.microsoft.com/office/powerpoint/2010/main" val="3570531672"/>
+        <p14:creationId xmlns:p14="http://schemas.microsoft.com/office/powerpoint/2010/main" val="1346333622"/>
       </p:ext>
     </p:extLst>
   </p:cSld>
@@ -7655,13 +7504,7 @@
       </p:grpSpPr>
       <p:sp>
         <p:nvSpPr>
-          <p:cNvPr id="2" name="Title 1">
-            <a:extLst>
-              <a:ext uri="{FF2B5EF4-FFF2-40B4-BE49-F238E27FC236}">
-                <a16:creationId xmlns:a16="http://schemas.microsoft.com/office/drawing/2014/main" id="{942B07CE-6F5D-400A-953D-F20DDDB609A1}"/>
-              </a:ext>
-            </a:extLst>
-          </p:cNvPr>
+          <p:cNvPr id="2" name="Title 1"/>
           <p:cNvSpPr>
             <a:spLocks noGrp="1"/>
           </p:cNvSpPr>
@@ -7678,19 +7521,13 @@
               <a:rPr lang="en-US"/>
               <a:t>Click to edit Master title style</a:t>
             </a:r>
-            <a:endParaRPr lang="en-AU"/>
+            <a:endParaRPr lang="en-US" dirty="0"/>
           </a:p>
         </p:txBody>
       </p:sp>
       <p:sp>
         <p:nvSpPr>
-          <p:cNvPr id="3" name="Content Placeholder 2">
-            <a:extLst>
-              <a:ext uri="{FF2B5EF4-FFF2-40B4-BE49-F238E27FC236}">
-                <a16:creationId xmlns:a16="http://schemas.microsoft.com/office/drawing/2014/main" id="{36D02CAC-0BD7-4BE3-93D3-7E7F5352D3D8}"/>
-              </a:ext>
-            </a:extLst>
-          </p:cNvPr>
+          <p:cNvPr id="3" name="Content Placeholder 2"/>
           <p:cNvSpPr>
             <a:spLocks noGrp="1"/>
           </p:cNvSpPr>
@@ -7700,8 +7537,8 @@
         </p:nvSpPr>
         <p:spPr>
           <a:xfrm>
-            <a:off x="838200" y="1825625"/>
-            <a:ext cx="5181600" cy="4351338"/>
+            <a:off x="990014" y="2874937"/>
+            <a:ext cx="6120091" cy="6852350"/>
           </a:xfrm>
         </p:spPr>
         <p:txBody>
@@ -7741,19 +7578,13 @@
               <a:rPr lang="en-US"/>
               <a:t>Fifth level</a:t>
             </a:r>
-            <a:endParaRPr lang="en-AU"/>
+            <a:endParaRPr lang="en-US" dirty="0"/>
           </a:p>
         </p:txBody>
       </p:sp>
       <p:sp>
         <p:nvSpPr>
-          <p:cNvPr id="4" name="Content Placeholder 3">
-            <a:extLst>
-              <a:ext uri="{FF2B5EF4-FFF2-40B4-BE49-F238E27FC236}">
-                <a16:creationId xmlns:a16="http://schemas.microsoft.com/office/drawing/2014/main" id="{5FE13768-0B78-4545-BC40-AAFBA004B6FA}"/>
-              </a:ext>
-            </a:extLst>
-          </p:cNvPr>
+          <p:cNvPr id="4" name="Content Placeholder 3"/>
           <p:cNvSpPr>
             <a:spLocks noGrp="1"/>
           </p:cNvSpPr>
@@ -7763,8 +7594,8 @@
         </p:nvSpPr>
         <p:spPr>
           <a:xfrm>
-            <a:off x="6172200" y="1825625"/>
-            <a:ext cx="5181600" cy="4351338"/>
+            <a:off x="7290108" y="2874937"/>
+            <a:ext cx="6120091" cy="6852350"/>
           </a:xfrm>
         </p:spPr>
         <p:txBody>
@@ -7804,19 +7635,13 @@
               <a:rPr lang="en-US"/>
               <a:t>Fifth level</a:t>
             </a:r>
-            <a:endParaRPr lang="en-AU"/>
+            <a:endParaRPr lang="en-US" dirty="0"/>
           </a:p>
         </p:txBody>
       </p:sp>
       <p:sp>
         <p:nvSpPr>
-          <p:cNvPr id="5" name="Date Placeholder 4">
-            <a:extLst>
-              <a:ext uri="{FF2B5EF4-FFF2-40B4-BE49-F238E27FC236}">
-                <a16:creationId xmlns:a16="http://schemas.microsoft.com/office/drawing/2014/main" id="{6AB131DE-0768-44B3-8D2A-A66F5B43E50B}"/>
-              </a:ext>
-            </a:extLst>
-          </p:cNvPr>
+          <p:cNvPr id="5" name="Date Placeholder 4"/>
           <p:cNvSpPr>
             <a:spLocks noGrp="1"/>
           </p:cNvSpPr>
@@ -7831,7 +7656,7 @@
           <a:p>
             <a:fld id="{85C9B555-08B4-40A8-BBAB-879833AA5A7D}" type="datetimeFigureOut">
               <a:rPr lang="en-AU" smtClean="0"/>
-              <a:t>4/02/2022</a:t>
+              <a:t>24/02/2022</a:t>
             </a:fld>
             <a:endParaRPr lang="en-AU"/>
           </a:p>
@@ -7839,13 +7664,7 @@
       </p:sp>
       <p:sp>
         <p:nvSpPr>
-          <p:cNvPr id="6" name="Footer Placeholder 5">
-            <a:extLst>
-              <a:ext uri="{FF2B5EF4-FFF2-40B4-BE49-F238E27FC236}">
-                <a16:creationId xmlns:a16="http://schemas.microsoft.com/office/drawing/2014/main" id="{46B65753-4C3C-41C9-96E9-D843ACDA8CC7}"/>
-              </a:ext>
-            </a:extLst>
-          </p:cNvPr>
+          <p:cNvPr id="6" name="Footer Placeholder 5"/>
           <p:cNvSpPr>
             <a:spLocks noGrp="1"/>
           </p:cNvSpPr>
@@ -7864,13 +7683,7 @@
       </p:sp>
       <p:sp>
         <p:nvSpPr>
-          <p:cNvPr id="7" name="Slide Number Placeholder 6">
-            <a:extLst>
-              <a:ext uri="{FF2B5EF4-FFF2-40B4-BE49-F238E27FC236}">
-                <a16:creationId xmlns:a16="http://schemas.microsoft.com/office/drawing/2014/main" id="{E443BBBC-FBD7-4628-8923-0560779BF5E1}"/>
-              </a:ext>
-            </a:extLst>
-          </p:cNvPr>
+          <p:cNvPr id="7" name="Slide Number Placeholder 6"/>
           <p:cNvSpPr>
             <a:spLocks noGrp="1"/>
           </p:cNvSpPr>
@@ -7894,7 +7707,7 @@
     </p:spTree>
     <p:extLst>
       <p:ext uri="{BB962C8B-B14F-4D97-AF65-F5344CB8AC3E}">
-        <p14:creationId xmlns:p14="http://schemas.microsoft.com/office/powerpoint/2010/main" val="1649234297"/>
+        <p14:creationId xmlns:p14="http://schemas.microsoft.com/office/powerpoint/2010/main" val="4294691155"/>
       </p:ext>
     </p:extLst>
   </p:cSld>
@@ -7923,13 +7736,7 @@
       </p:grpSpPr>
       <p:sp>
         <p:nvSpPr>
-          <p:cNvPr id="2" name="Title 1">
-            <a:extLst>
-              <a:ext uri="{FF2B5EF4-FFF2-40B4-BE49-F238E27FC236}">
-                <a16:creationId xmlns:a16="http://schemas.microsoft.com/office/drawing/2014/main" id="{1023841A-90F7-4617-86B6-C1F09AA6BFF1}"/>
-              </a:ext>
-            </a:extLst>
-          </p:cNvPr>
+          <p:cNvPr id="2" name="Title 1"/>
           <p:cNvSpPr>
             <a:spLocks noGrp="1"/>
           </p:cNvSpPr>
@@ -7939,8 +7746,8 @@
         </p:nvSpPr>
         <p:spPr>
           <a:xfrm>
-            <a:off x="839788" y="365125"/>
-            <a:ext cx="10515600" cy="1325563"/>
+            <a:off x="991890" y="574990"/>
+            <a:ext cx="12420184" cy="2087455"/>
           </a:xfrm>
         </p:spPr>
         <p:txBody>
@@ -7951,19 +7758,13 @@
               <a:rPr lang="en-US"/>
               <a:t>Click to edit Master title style</a:t>
             </a:r>
-            <a:endParaRPr lang="en-AU"/>
+            <a:endParaRPr lang="en-US" dirty="0"/>
           </a:p>
         </p:txBody>
       </p:sp>
       <p:sp>
         <p:nvSpPr>
-          <p:cNvPr id="3" name="Text Placeholder 2">
-            <a:extLst>
-              <a:ext uri="{FF2B5EF4-FFF2-40B4-BE49-F238E27FC236}">
-                <a16:creationId xmlns:a16="http://schemas.microsoft.com/office/drawing/2014/main" id="{D1D9DD91-A3FC-470F-A1D9-F30CFD08EDA2}"/>
-              </a:ext>
-            </a:extLst>
-          </p:cNvPr>
+          <p:cNvPr id="3" name="Text Placeholder 2"/>
           <p:cNvSpPr>
             <a:spLocks noGrp="1"/>
           </p:cNvSpPr>
@@ -7973,8 +7774,8 @@
         </p:nvSpPr>
         <p:spPr>
           <a:xfrm>
-            <a:off x="839788" y="1681163"/>
-            <a:ext cx="5157787" cy="823912"/>
+            <a:off x="991892" y="2647443"/>
+            <a:ext cx="6091964" cy="1297471"/>
           </a:xfrm>
         </p:spPr>
         <p:txBody>
@@ -7982,39 +7783,39 @@
           <a:lstStyle>
             <a:lvl1pPr marL="0" indent="0">
               <a:buNone/>
-              <a:defRPr sz="2400" b="1"/>
+              <a:defRPr sz="3780" b="1"/>
             </a:lvl1pPr>
-            <a:lvl2pPr marL="457200" indent="0">
+            <a:lvl2pPr marL="719999" indent="0">
               <a:buNone/>
-              <a:defRPr sz="2000" b="1"/>
+              <a:defRPr sz="3150" b="1"/>
             </a:lvl2pPr>
-            <a:lvl3pPr marL="914400" indent="0">
+            <a:lvl3pPr marL="1439997" indent="0">
               <a:buNone/>
-              <a:defRPr sz="1800" b="1"/>
+              <a:defRPr sz="2835" b="1"/>
             </a:lvl3pPr>
-            <a:lvl4pPr marL="1371600" indent="0">
+            <a:lvl4pPr marL="2159996" indent="0">
               <a:buNone/>
-              <a:defRPr sz="1600" b="1"/>
+              <a:defRPr sz="2520" b="1"/>
             </a:lvl4pPr>
-            <a:lvl5pPr marL="1828800" indent="0">
+            <a:lvl5pPr marL="2879994" indent="0">
               <a:buNone/>
-              <a:defRPr sz="1600" b="1"/>
+              <a:defRPr sz="2520" b="1"/>
             </a:lvl5pPr>
-            <a:lvl6pPr marL="2286000" indent="0">
+            <a:lvl6pPr marL="3599993" indent="0">
               <a:buNone/>
-              <a:defRPr sz="1600" b="1"/>
+              <a:defRPr sz="2520" b="1"/>
             </a:lvl6pPr>
-            <a:lvl7pPr marL="2743200" indent="0">
+            <a:lvl7pPr marL="4319991" indent="0">
               <a:buNone/>
-              <a:defRPr sz="1600" b="1"/>
+              <a:defRPr sz="2520" b="1"/>
             </a:lvl7pPr>
-            <a:lvl8pPr marL="3200400" indent="0">
+            <a:lvl8pPr marL="5039990" indent="0">
               <a:buNone/>
-              <a:defRPr sz="1600" b="1"/>
+              <a:defRPr sz="2520" b="1"/>
             </a:lvl8pPr>
-            <a:lvl9pPr marL="3657600" indent="0">
+            <a:lvl9pPr marL="5759988" indent="0">
               <a:buNone/>
-              <a:defRPr sz="1600" b="1"/>
+              <a:defRPr sz="2520" b="1"/>
             </a:lvl9pPr>
           </a:lstStyle>
           <a:p>
@@ -8028,13 +7829,7 @@
       </p:sp>
       <p:sp>
         <p:nvSpPr>
-          <p:cNvPr id="4" name="Content Placeholder 3">
-            <a:extLst>
-              <a:ext uri="{FF2B5EF4-FFF2-40B4-BE49-F238E27FC236}">
-                <a16:creationId xmlns:a16="http://schemas.microsoft.com/office/drawing/2014/main" id="{22BB4973-85F8-45AA-8B04-2E6063C0647B}"/>
-              </a:ext>
-            </a:extLst>
-          </p:cNvPr>
+          <p:cNvPr id="4" name="Content Placeholder 3"/>
           <p:cNvSpPr>
             <a:spLocks noGrp="1"/>
           </p:cNvSpPr>
@@ -8044,8 +7839,8 @@
         </p:nvSpPr>
         <p:spPr>
           <a:xfrm>
-            <a:off x="839788" y="2505075"/>
-            <a:ext cx="5157787" cy="3684588"/>
+            <a:off x="991892" y="3944914"/>
+            <a:ext cx="6091964" cy="5802373"/>
           </a:xfrm>
         </p:spPr>
         <p:txBody>
@@ -8085,19 +7880,13 @@
               <a:rPr lang="en-US"/>
               <a:t>Fifth level</a:t>
             </a:r>
-            <a:endParaRPr lang="en-AU"/>
+            <a:endParaRPr lang="en-US" dirty="0"/>
           </a:p>
         </p:txBody>
       </p:sp>
       <p:sp>
         <p:nvSpPr>
-          <p:cNvPr id="5" name="Text Placeholder 4">
-            <a:extLst>
-              <a:ext uri="{FF2B5EF4-FFF2-40B4-BE49-F238E27FC236}">
-                <a16:creationId xmlns:a16="http://schemas.microsoft.com/office/drawing/2014/main" id="{9C6A708D-2D46-495F-92CF-850A03212297}"/>
-              </a:ext>
-            </a:extLst>
-          </p:cNvPr>
+          <p:cNvPr id="5" name="Text Placeholder 4"/>
           <p:cNvSpPr>
             <a:spLocks noGrp="1"/>
           </p:cNvSpPr>
@@ -8107,8 +7896,8 @@
         </p:nvSpPr>
         <p:spPr>
           <a:xfrm>
-            <a:off x="6172200" y="1681163"/>
-            <a:ext cx="5183188" cy="823912"/>
+            <a:off x="7290109" y="2647443"/>
+            <a:ext cx="6121966" cy="1297471"/>
           </a:xfrm>
         </p:spPr>
         <p:txBody>
@@ -8116,39 +7905,39 @@
           <a:lstStyle>
             <a:lvl1pPr marL="0" indent="0">
               <a:buNone/>
-              <a:defRPr sz="2400" b="1"/>
+              <a:defRPr sz="3780" b="1"/>
             </a:lvl1pPr>
-            <a:lvl2pPr marL="457200" indent="0">
+            <a:lvl2pPr marL="719999" indent="0">
               <a:buNone/>
-              <a:defRPr sz="2000" b="1"/>
+              <a:defRPr sz="3150" b="1"/>
             </a:lvl2pPr>
-            <a:lvl3pPr marL="914400" indent="0">
+            <a:lvl3pPr marL="1439997" indent="0">
               <a:buNone/>
-              <a:defRPr sz="1800" b="1"/>
+              <a:defRPr sz="2835" b="1"/>
             </a:lvl3pPr>
-            <a:lvl4pPr marL="1371600" indent="0">
+            <a:lvl4pPr marL="2159996" indent="0">
               <a:buNone/>
-              <a:defRPr sz="1600" b="1"/>
+              <a:defRPr sz="2520" b="1"/>
             </a:lvl4pPr>
-            <a:lvl5pPr marL="1828800" indent="0">
+            <a:lvl5pPr marL="2879994" indent="0">
               <a:buNone/>
-              <a:defRPr sz="1600" b="1"/>
+              <a:defRPr sz="2520" b="1"/>
             </a:lvl5pPr>
-            <a:lvl6pPr marL="2286000" indent="0">
+            <a:lvl6pPr marL="3599993" indent="0">
               <a:buNone/>
-              <a:defRPr sz="1600" b="1"/>
+              <a:defRPr sz="2520" b="1"/>
             </a:lvl6pPr>
-            <a:lvl7pPr marL="2743200" indent="0">
+            <a:lvl7pPr marL="4319991" indent="0">
               <a:buNone/>
-              <a:defRPr sz="1600" b="1"/>
+              <a:defRPr sz="2520" b="1"/>
             </a:lvl7pPr>
-            <a:lvl8pPr marL="3200400" indent="0">
+            <a:lvl8pPr marL="5039990" indent="0">
               <a:buNone/>
-              <a:defRPr sz="1600" b="1"/>
+              <a:defRPr sz="2520" b="1"/>
             </a:lvl8pPr>
-            <a:lvl9pPr marL="3657600" indent="0">
+            <a:lvl9pPr marL="5759988" indent="0">
               <a:buNone/>
-              <a:defRPr sz="1600" b="1"/>
+              <a:defRPr sz="2520" b="1"/>
             </a:lvl9pPr>
           </a:lstStyle>
           <a:p>
@@ -8162,13 +7951,7 @@
       </p:sp>
       <p:sp>
         <p:nvSpPr>
-          <p:cNvPr id="6" name="Content Placeholder 5">
-            <a:extLst>
-              <a:ext uri="{FF2B5EF4-FFF2-40B4-BE49-F238E27FC236}">
-                <a16:creationId xmlns:a16="http://schemas.microsoft.com/office/drawing/2014/main" id="{45FBE18C-A256-4BBD-A1B1-D7A225412254}"/>
-              </a:ext>
-            </a:extLst>
-          </p:cNvPr>
+          <p:cNvPr id="6" name="Content Placeholder 5"/>
           <p:cNvSpPr>
             <a:spLocks noGrp="1"/>
           </p:cNvSpPr>
@@ -8178,8 +7961,8 @@
         </p:nvSpPr>
         <p:spPr>
           <a:xfrm>
-            <a:off x="6172200" y="2505075"/>
-            <a:ext cx="5183188" cy="3684588"/>
+            <a:off x="7290109" y="3944914"/>
+            <a:ext cx="6121966" cy="5802373"/>
           </a:xfrm>
         </p:spPr>
         <p:txBody>
@@ -8219,19 +8002,13 @@
               <a:rPr lang="en-US"/>
               <a:t>Fifth level</a:t>
             </a:r>
-            <a:endParaRPr lang="en-AU"/>
+            <a:endParaRPr lang="en-US" dirty="0"/>
           </a:p>
         </p:txBody>
       </p:sp>
       <p:sp>
         <p:nvSpPr>
-          <p:cNvPr id="7" name="Date Placeholder 6">
-            <a:extLst>
-              <a:ext uri="{FF2B5EF4-FFF2-40B4-BE49-F238E27FC236}">
-                <a16:creationId xmlns:a16="http://schemas.microsoft.com/office/drawing/2014/main" id="{5146FAA0-E839-498A-A2AD-9065920529F5}"/>
-              </a:ext>
-            </a:extLst>
-          </p:cNvPr>
+          <p:cNvPr id="7" name="Date Placeholder 6"/>
           <p:cNvSpPr>
             <a:spLocks noGrp="1"/>
           </p:cNvSpPr>
@@ -8246,7 +8023,7 @@
           <a:p>
             <a:fld id="{85C9B555-08B4-40A8-BBAB-879833AA5A7D}" type="datetimeFigureOut">
               <a:rPr lang="en-AU" smtClean="0"/>
-              <a:t>4/02/2022</a:t>
+              <a:t>24/02/2022</a:t>
             </a:fld>
             <a:endParaRPr lang="en-AU"/>
           </a:p>
@@ -8254,13 +8031,7 @@
       </p:sp>
       <p:sp>
         <p:nvSpPr>
-          <p:cNvPr id="8" name="Footer Placeholder 7">
-            <a:extLst>
-              <a:ext uri="{FF2B5EF4-FFF2-40B4-BE49-F238E27FC236}">
-                <a16:creationId xmlns:a16="http://schemas.microsoft.com/office/drawing/2014/main" id="{1E59B628-5CB3-4242-826A-861EB162EDC2}"/>
-              </a:ext>
-            </a:extLst>
-          </p:cNvPr>
+          <p:cNvPr id="8" name="Footer Placeholder 7"/>
           <p:cNvSpPr>
             <a:spLocks noGrp="1"/>
           </p:cNvSpPr>
@@ -8279,13 +8050,7 @@
       </p:sp>
       <p:sp>
         <p:nvSpPr>
-          <p:cNvPr id="9" name="Slide Number Placeholder 8">
-            <a:extLst>
-              <a:ext uri="{FF2B5EF4-FFF2-40B4-BE49-F238E27FC236}">
-                <a16:creationId xmlns:a16="http://schemas.microsoft.com/office/drawing/2014/main" id="{55FE86E1-2EB3-42D2-B734-930700F93733}"/>
-              </a:ext>
-            </a:extLst>
-          </p:cNvPr>
+          <p:cNvPr id="9" name="Slide Number Placeholder 8"/>
           <p:cNvSpPr>
             <a:spLocks noGrp="1"/>
           </p:cNvSpPr>
@@ -8309,7 +8074,7 @@
     </p:spTree>
     <p:extLst>
       <p:ext uri="{BB962C8B-B14F-4D97-AF65-F5344CB8AC3E}">
-        <p14:creationId xmlns:p14="http://schemas.microsoft.com/office/powerpoint/2010/main" val="1928456122"/>
+        <p14:creationId xmlns:p14="http://schemas.microsoft.com/office/powerpoint/2010/main" val="1537046219"/>
       </p:ext>
     </p:extLst>
   </p:cSld>
@@ -8338,13 +8103,7 @@
       </p:grpSpPr>
       <p:sp>
         <p:nvSpPr>
-          <p:cNvPr id="2" name="Title 1">
-            <a:extLst>
-              <a:ext uri="{FF2B5EF4-FFF2-40B4-BE49-F238E27FC236}">
-                <a16:creationId xmlns:a16="http://schemas.microsoft.com/office/drawing/2014/main" id="{2F549FD0-9221-4185-A947-5211956277BC}"/>
-              </a:ext>
-            </a:extLst>
-          </p:cNvPr>
+          <p:cNvPr id="2" name="Title 1"/>
           <p:cNvSpPr>
             <a:spLocks noGrp="1"/>
           </p:cNvSpPr>
@@ -8361,19 +8120,13 @@
               <a:rPr lang="en-US"/>
               <a:t>Click to edit Master title style</a:t>
             </a:r>
-            <a:endParaRPr lang="en-AU"/>
+            <a:endParaRPr lang="en-US" dirty="0"/>
           </a:p>
         </p:txBody>
       </p:sp>
       <p:sp>
         <p:nvSpPr>
-          <p:cNvPr id="3" name="Date Placeholder 2">
-            <a:extLst>
-              <a:ext uri="{FF2B5EF4-FFF2-40B4-BE49-F238E27FC236}">
-                <a16:creationId xmlns:a16="http://schemas.microsoft.com/office/drawing/2014/main" id="{54C7529F-4DB3-4A55-B9DA-D0A5C131D20C}"/>
-              </a:ext>
-            </a:extLst>
-          </p:cNvPr>
+          <p:cNvPr id="3" name="Date Placeholder 2"/>
           <p:cNvSpPr>
             <a:spLocks noGrp="1"/>
           </p:cNvSpPr>
@@ -8388,7 +8141,7 @@
           <a:p>
             <a:fld id="{85C9B555-08B4-40A8-BBAB-879833AA5A7D}" type="datetimeFigureOut">
               <a:rPr lang="en-AU" smtClean="0"/>
-              <a:t>4/02/2022</a:t>
+              <a:t>24/02/2022</a:t>
             </a:fld>
             <a:endParaRPr lang="en-AU"/>
           </a:p>
@@ -8396,13 +8149,7 @@
       </p:sp>
       <p:sp>
         <p:nvSpPr>
-          <p:cNvPr id="4" name="Footer Placeholder 3">
-            <a:extLst>
-              <a:ext uri="{FF2B5EF4-FFF2-40B4-BE49-F238E27FC236}">
-                <a16:creationId xmlns:a16="http://schemas.microsoft.com/office/drawing/2014/main" id="{8FFE8F81-E26B-4D2D-AE7A-EB9BEAF96835}"/>
-              </a:ext>
-            </a:extLst>
-          </p:cNvPr>
+          <p:cNvPr id="4" name="Footer Placeholder 3"/>
           <p:cNvSpPr>
             <a:spLocks noGrp="1"/>
           </p:cNvSpPr>
@@ -8421,13 +8168,7 @@
       </p:sp>
       <p:sp>
         <p:nvSpPr>
-          <p:cNvPr id="5" name="Slide Number Placeholder 4">
-            <a:extLst>
-              <a:ext uri="{FF2B5EF4-FFF2-40B4-BE49-F238E27FC236}">
-                <a16:creationId xmlns:a16="http://schemas.microsoft.com/office/drawing/2014/main" id="{19F17A70-565A-40CA-A062-145A73D7D355}"/>
-              </a:ext>
-            </a:extLst>
-          </p:cNvPr>
+          <p:cNvPr id="5" name="Slide Number Placeholder 4"/>
           <p:cNvSpPr>
             <a:spLocks noGrp="1"/>
           </p:cNvSpPr>
@@ -8451,7 +8192,7 @@
     </p:spTree>
     <p:extLst>
       <p:ext uri="{BB962C8B-B14F-4D97-AF65-F5344CB8AC3E}">
-        <p14:creationId xmlns:p14="http://schemas.microsoft.com/office/powerpoint/2010/main" val="678300777"/>
+        <p14:creationId xmlns:p14="http://schemas.microsoft.com/office/powerpoint/2010/main" val="3720258397"/>
       </p:ext>
     </p:extLst>
   </p:cSld>
@@ -8480,13 +8221,7 @@
       </p:grpSpPr>
       <p:sp>
         <p:nvSpPr>
-          <p:cNvPr id="2" name="Date Placeholder 1">
-            <a:extLst>
-              <a:ext uri="{FF2B5EF4-FFF2-40B4-BE49-F238E27FC236}">
-                <a16:creationId xmlns:a16="http://schemas.microsoft.com/office/drawing/2014/main" id="{AAA99CD6-4539-44FC-974C-FE359459AD75}"/>
-              </a:ext>
-            </a:extLst>
-          </p:cNvPr>
+          <p:cNvPr id="2" name="Date Placeholder 1"/>
           <p:cNvSpPr>
             <a:spLocks noGrp="1"/>
           </p:cNvSpPr>
@@ -8501,7 +8236,7 @@
           <a:p>
             <a:fld id="{85C9B555-08B4-40A8-BBAB-879833AA5A7D}" type="datetimeFigureOut">
               <a:rPr lang="en-AU" smtClean="0"/>
-              <a:t>4/02/2022</a:t>
+              <a:t>24/02/2022</a:t>
             </a:fld>
             <a:endParaRPr lang="en-AU"/>
           </a:p>
@@ -8509,13 +8244,7 @@
       </p:sp>
       <p:sp>
         <p:nvSpPr>
-          <p:cNvPr id="3" name="Footer Placeholder 2">
-            <a:extLst>
-              <a:ext uri="{FF2B5EF4-FFF2-40B4-BE49-F238E27FC236}">
-                <a16:creationId xmlns:a16="http://schemas.microsoft.com/office/drawing/2014/main" id="{9FAE060B-50BA-4091-9258-8546B6D88B38}"/>
-              </a:ext>
-            </a:extLst>
-          </p:cNvPr>
+          <p:cNvPr id="3" name="Footer Placeholder 2"/>
           <p:cNvSpPr>
             <a:spLocks noGrp="1"/>
           </p:cNvSpPr>
@@ -8534,13 +8263,7 @@
       </p:sp>
       <p:sp>
         <p:nvSpPr>
-          <p:cNvPr id="4" name="Slide Number Placeholder 3">
-            <a:extLst>
-              <a:ext uri="{FF2B5EF4-FFF2-40B4-BE49-F238E27FC236}">
-                <a16:creationId xmlns:a16="http://schemas.microsoft.com/office/drawing/2014/main" id="{B6DA3FE0-1C7C-4A87-B3BD-89A5D89576F2}"/>
-              </a:ext>
-            </a:extLst>
-          </p:cNvPr>
+          <p:cNvPr id="4" name="Slide Number Placeholder 3"/>
           <p:cNvSpPr>
             <a:spLocks noGrp="1"/>
           </p:cNvSpPr>
@@ -8564,7 +8287,7 @@
     </p:spTree>
     <p:extLst>
       <p:ext uri="{BB962C8B-B14F-4D97-AF65-F5344CB8AC3E}">
-        <p14:creationId xmlns:p14="http://schemas.microsoft.com/office/powerpoint/2010/main" val="1644142209"/>
+        <p14:creationId xmlns:p14="http://schemas.microsoft.com/office/powerpoint/2010/main" val="1996501979"/>
       </p:ext>
     </p:extLst>
   </p:cSld>
@@ -8593,13 +8316,7 @@
       </p:grpSpPr>
       <p:sp>
         <p:nvSpPr>
-          <p:cNvPr id="2" name="Title 1">
-            <a:extLst>
-              <a:ext uri="{FF2B5EF4-FFF2-40B4-BE49-F238E27FC236}">
-                <a16:creationId xmlns:a16="http://schemas.microsoft.com/office/drawing/2014/main" id="{5366D655-90E6-444F-B960-B613D1ADEDA0}"/>
-              </a:ext>
-            </a:extLst>
-          </p:cNvPr>
+          <p:cNvPr id="2" name="Title 1"/>
           <p:cNvSpPr>
             <a:spLocks noGrp="1"/>
           </p:cNvSpPr>
@@ -8609,15 +8326,15 @@
         </p:nvSpPr>
         <p:spPr>
           <a:xfrm>
-            <a:off x="839788" y="457200"/>
-            <a:ext cx="3932237" cy="1600200"/>
+            <a:off x="991890" y="719984"/>
+            <a:ext cx="4644444" cy="2519945"/>
           </a:xfrm>
         </p:spPr>
         <p:txBody>
           <a:bodyPr anchor="b"/>
           <a:lstStyle>
             <a:lvl1pPr>
-              <a:defRPr sz="3200"/>
+              <a:defRPr sz="5039"/>
             </a:lvl1pPr>
           </a:lstStyle>
           <a:p>
@@ -8625,19 +8342,13 @@
               <a:rPr lang="en-US"/>
               <a:t>Click to edit Master title style</a:t>
             </a:r>
-            <a:endParaRPr lang="en-AU"/>
+            <a:endParaRPr lang="en-US" dirty="0"/>
           </a:p>
         </p:txBody>
       </p:sp>
       <p:sp>
         <p:nvSpPr>
-          <p:cNvPr id="3" name="Content Placeholder 2">
-            <a:extLst>
-              <a:ext uri="{FF2B5EF4-FFF2-40B4-BE49-F238E27FC236}">
-                <a16:creationId xmlns:a16="http://schemas.microsoft.com/office/drawing/2014/main" id="{3466CC83-3C14-4001-B8CF-517A2EB063D8}"/>
-              </a:ext>
-            </a:extLst>
-          </p:cNvPr>
+          <p:cNvPr id="3" name="Content Placeholder 2"/>
           <p:cNvSpPr>
             <a:spLocks noGrp="1"/>
           </p:cNvSpPr>
@@ -8647,39 +8358,39 @@
         </p:nvSpPr>
         <p:spPr>
           <a:xfrm>
-            <a:off x="5183188" y="987425"/>
-            <a:ext cx="6172200" cy="4873625"/>
+            <a:off x="6121966" y="1554968"/>
+            <a:ext cx="7290108" cy="7674832"/>
           </a:xfrm>
         </p:spPr>
         <p:txBody>
           <a:bodyPr/>
           <a:lstStyle>
             <a:lvl1pPr>
-              <a:defRPr sz="3200"/>
+              <a:defRPr sz="5039"/>
             </a:lvl1pPr>
             <a:lvl2pPr>
-              <a:defRPr sz="2800"/>
+              <a:defRPr sz="4409"/>
             </a:lvl2pPr>
             <a:lvl3pPr>
-              <a:defRPr sz="2400"/>
+              <a:defRPr sz="3780"/>
             </a:lvl3pPr>
             <a:lvl4pPr>
-              <a:defRPr sz="2000"/>
+              <a:defRPr sz="3150"/>
             </a:lvl4pPr>
             <a:lvl5pPr>
-              <a:defRPr sz="2000"/>
+              <a:defRPr sz="3150"/>
             </a:lvl5pPr>
             <a:lvl6pPr>
-              <a:defRPr sz="2000"/>
+              <a:defRPr sz="3150"/>
             </a:lvl6pPr>
             <a:lvl7pPr>
-              <a:defRPr sz="2000"/>
+              <a:defRPr sz="3150"/>
             </a:lvl7pPr>
             <a:lvl8pPr>
-              <a:defRPr sz="2000"/>
+              <a:defRPr sz="3150"/>
             </a:lvl8pPr>
             <a:lvl9pPr>
-              <a:defRPr sz="2000"/>
+              <a:defRPr sz="3150"/>
             </a:lvl9pPr>
           </a:lstStyle>
           <a:p>
@@ -8716,19 +8427,13 @@
               <a:rPr lang="en-US"/>
               <a:t>Fifth level</a:t>
             </a:r>
-            <a:endParaRPr lang="en-AU"/>
+            <a:endParaRPr lang="en-US" dirty="0"/>
           </a:p>
         </p:txBody>
       </p:sp>
       <p:sp>
         <p:nvSpPr>
-          <p:cNvPr id="4" name="Text Placeholder 3">
-            <a:extLst>
-              <a:ext uri="{FF2B5EF4-FFF2-40B4-BE49-F238E27FC236}">
-                <a16:creationId xmlns:a16="http://schemas.microsoft.com/office/drawing/2014/main" id="{01156E6A-9335-423C-845D-8BDEA9357BC6}"/>
-              </a:ext>
-            </a:extLst>
-          </p:cNvPr>
+          <p:cNvPr id="4" name="Text Placeholder 3"/>
           <p:cNvSpPr>
             <a:spLocks noGrp="1"/>
           </p:cNvSpPr>
@@ -8738,8 +8443,8 @@
         </p:nvSpPr>
         <p:spPr>
           <a:xfrm>
-            <a:off x="839788" y="2057400"/>
-            <a:ext cx="3932237" cy="3811588"/>
+            <a:off x="991890" y="3239929"/>
+            <a:ext cx="4644444" cy="6002369"/>
           </a:xfrm>
         </p:spPr>
         <p:txBody>
@@ -8747,39 +8452,39 @@
           <a:lstStyle>
             <a:lvl1pPr marL="0" indent="0">
               <a:buNone/>
-              <a:defRPr sz="1600"/>
+              <a:defRPr sz="2520"/>
             </a:lvl1pPr>
-            <a:lvl2pPr marL="457200" indent="0">
+            <a:lvl2pPr marL="719999" indent="0">
               <a:buNone/>
-              <a:defRPr sz="1400"/>
+              <a:defRPr sz="2205"/>
             </a:lvl2pPr>
-            <a:lvl3pPr marL="914400" indent="0">
+            <a:lvl3pPr marL="1439997" indent="0">
               <a:buNone/>
-              <a:defRPr sz="1200"/>
+              <a:defRPr sz="1890"/>
             </a:lvl3pPr>
-            <a:lvl4pPr marL="1371600" indent="0">
+            <a:lvl4pPr marL="2159996" indent="0">
               <a:buNone/>
-              <a:defRPr sz="1000"/>
+              <a:defRPr sz="1575"/>
             </a:lvl4pPr>
-            <a:lvl5pPr marL="1828800" indent="0">
+            <a:lvl5pPr marL="2879994" indent="0">
               <a:buNone/>
-              <a:defRPr sz="1000"/>
+              <a:defRPr sz="1575"/>
             </a:lvl5pPr>
-            <a:lvl6pPr marL="2286000" indent="0">
+            <a:lvl6pPr marL="3599993" indent="0">
               <a:buNone/>
-              <a:defRPr sz="1000"/>
+              <a:defRPr sz="1575"/>
             </a:lvl6pPr>
-            <a:lvl7pPr marL="2743200" indent="0">
+            <a:lvl7pPr marL="4319991" indent="0">
               <a:buNone/>
-              <a:defRPr sz="1000"/>
+              <a:defRPr sz="1575"/>
             </a:lvl7pPr>
-            <a:lvl8pPr marL="3200400" indent="0">
+            <a:lvl8pPr marL="5039990" indent="0">
               <a:buNone/>
-              <a:defRPr sz="1000"/>
+              <a:defRPr sz="1575"/>
             </a:lvl8pPr>
-            <a:lvl9pPr marL="3657600" indent="0">
+            <a:lvl9pPr marL="5759988" indent="0">
               <a:buNone/>
-              <a:defRPr sz="1000"/>
+              <a:defRPr sz="1575"/>
             </a:lvl9pPr>
           </a:lstStyle>
           <a:p>
@@ -8793,13 +8498,7 @@
       </p:sp>
       <p:sp>
         <p:nvSpPr>
-          <p:cNvPr id="5" name="Date Placeholder 4">
-            <a:extLst>
-              <a:ext uri="{FF2B5EF4-FFF2-40B4-BE49-F238E27FC236}">
-                <a16:creationId xmlns:a16="http://schemas.microsoft.com/office/drawing/2014/main" id="{A7480556-8903-4A47-8537-57E7CFE526FB}"/>
-              </a:ext>
-            </a:extLst>
-          </p:cNvPr>
+          <p:cNvPr id="5" name="Date Placeholder 4"/>
           <p:cNvSpPr>
             <a:spLocks noGrp="1"/>
           </p:cNvSpPr>
@@ -8814,7 +8513,7 @@
           <a:p>
             <a:fld id="{85C9B555-08B4-40A8-BBAB-879833AA5A7D}" type="datetimeFigureOut">
               <a:rPr lang="en-AU" smtClean="0"/>
-              <a:t>4/02/2022</a:t>
+              <a:t>24/02/2022</a:t>
             </a:fld>
             <a:endParaRPr lang="en-AU"/>
           </a:p>
@@ -8822,13 +8521,7 @@
       </p:sp>
       <p:sp>
         <p:nvSpPr>
-          <p:cNvPr id="6" name="Footer Placeholder 5">
-            <a:extLst>
-              <a:ext uri="{FF2B5EF4-FFF2-40B4-BE49-F238E27FC236}">
-                <a16:creationId xmlns:a16="http://schemas.microsoft.com/office/drawing/2014/main" id="{A002EE82-A532-48BE-892E-0B986257106D}"/>
-              </a:ext>
-            </a:extLst>
-          </p:cNvPr>
+          <p:cNvPr id="6" name="Footer Placeholder 5"/>
           <p:cNvSpPr>
             <a:spLocks noGrp="1"/>
           </p:cNvSpPr>
@@ -8847,13 +8540,7 @@
       </p:sp>
       <p:sp>
         <p:nvSpPr>
-          <p:cNvPr id="7" name="Slide Number Placeholder 6">
-            <a:extLst>
-              <a:ext uri="{FF2B5EF4-FFF2-40B4-BE49-F238E27FC236}">
-                <a16:creationId xmlns:a16="http://schemas.microsoft.com/office/drawing/2014/main" id="{EDE5A646-5B95-4798-AC56-4F24642E9922}"/>
-              </a:ext>
-            </a:extLst>
-          </p:cNvPr>
+          <p:cNvPr id="7" name="Slide Number Placeholder 6"/>
           <p:cNvSpPr>
             <a:spLocks noGrp="1"/>
           </p:cNvSpPr>
@@ -8877,7 +8564,7 @@
     </p:spTree>
     <p:extLst>
       <p:ext uri="{BB962C8B-B14F-4D97-AF65-F5344CB8AC3E}">
-        <p14:creationId xmlns:p14="http://schemas.microsoft.com/office/powerpoint/2010/main" val="1011784143"/>
+        <p14:creationId xmlns:p14="http://schemas.microsoft.com/office/powerpoint/2010/main" val="2243843279"/>
       </p:ext>
     </p:extLst>
   </p:cSld>
@@ -8906,13 +8593,7 @@
       </p:grpSpPr>
       <p:sp>
         <p:nvSpPr>
-          <p:cNvPr id="2" name="Title 1">
-            <a:extLst>
-              <a:ext uri="{FF2B5EF4-FFF2-40B4-BE49-F238E27FC236}">
-                <a16:creationId xmlns:a16="http://schemas.microsoft.com/office/drawing/2014/main" id="{44E088BE-5968-4179-BC71-26A0373C271F}"/>
-              </a:ext>
-            </a:extLst>
-          </p:cNvPr>
+          <p:cNvPr id="2" name="Title 1"/>
           <p:cNvSpPr>
             <a:spLocks noGrp="1"/>
           </p:cNvSpPr>
@@ -8922,15 +8603,15 @@
         </p:nvSpPr>
         <p:spPr>
           <a:xfrm>
-            <a:off x="839788" y="457200"/>
-            <a:ext cx="3932237" cy="1600200"/>
+            <a:off x="991890" y="719984"/>
+            <a:ext cx="4644444" cy="2519945"/>
           </a:xfrm>
         </p:spPr>
         <p:txBody>
           <a:bodyPr anchor="b"/>
           <a:lstStyle>
             <a:lvl1pPr>
-              <a:defRPr sz="3200"/>
+              <a:defRPr sz="5039"/>
             </a:lvl1pPr>
           </a:lstStyle>
           <a:p>
@@ -8938,21 +8619,15 @@
               <a:rPr lang="en-US"/>
               <a:t>Click to edit Master title style</a:t>
             </a:r>
-            <a:endParaRPr lang="en-AU"/>
+            <a:endParaRPr lang="en-US" dirty="0"/>
           </a:p>
         </p:txBody>
       </p:sp>
       <p:sp>
         <p:nvSpPr>
-          <p:cNvPr id="3" name="Picture Placeholder 2">
-            <a:extLst>
-              <a:ext uri="{FF2B5EF4-FFF2-40B4-BE49-F238E27FC236}">
-                <a16:creationId xmlns:a16="http://schemas.microsoft.com/office/drawing/2014/main" id="{581D6887-B81F-4B02-AD03-B38CB2A5771E}"/>
-              </a:ext>
-            </a:extLst>
-          </p:cNvPr>
+          <p:cNvPr id="3" name="Picture Placeholder 2"/>
           <p:cNvSpPr>
-            <a:spLocks noGrp="1"/>
+            <a:spLocks noGrp="1" noChangeAspect="1"/>
           </p:cNvSpPr>
           <p:nvPr>
             <p:ph type="pic" idx="1"/>
@@ -8960,64 +8635,62 @@
         </p:nvSpPr>
         <p:spPr>
           <a:xfrm>
-            <a:off x="5183188" y="987425"/>
-            <a:ext cx="6172200" cy="4873625"/>
+            <a:off x="6121966" y="1554968"/>
+            <a:ext cx="7290108" cy="7674832"/>
           </a:xfrm>
         </p:spPr>
         <p:txBody>
-          <a:bodyPr/>
+          <a:bodyPr anchor="t"/>
           <a:lstStyle>
             <a:lvl1pPr marL="0" indent="0">
               <a:buNone/>
-              <a:defRPr sz="3200"/>
+              <a:defRPr sz="5039"/>
             </a:lvl1pPr>
-            <a:lvl2pPr marL="457200" indent="0">
+            <a:lvl2pPr marL="719999" indent="0">
               <a:buNone/>
-              <a:defRPr sz="2800"/>
+              <a:defRPr sz="4409"/>
             </a:lvl2pPr>
-            <a:lvl3pPr marL="914400" indent="0">
+            <a:lvl3pPr marL="1439997" indent="0">
               <a:buNone/>
-              <a:defRPr sz="2400"/>
+              <a:defRPr sz="3780"/>
             </a:lvl3pPr>
-            <a:lvl4pPr marL="1371600" indent="0">
+            <a:lvl4pPr marL="2159996" indent="0">
               <a:buNone/>
-              <a:defRPr sz="2000"/>
+              <a:defRPr sz="3150"/>
             </a:lvl4pPr>
-            <a:lvl5pPr marL="1828800" indent="0">
+            <a:lvl5pPr marL="2879994" indent="0">
               <a:buNone/>
-              <a:defRPr sz="2000"/>
+              <a:defRPr sz="3150"/>
             </a:lvl5pPr>
-            <a:lvl6pPr marL="2286000" indent="0">
+            <a:lvl6pPr marL="3599993" indent="0">
               <a:buNone/>
-              <a:defRPr sz="2000"/>
+              <a:defRPr sz="3150"/>
             </a:lvl6pPr>
-            <a:lvl7pPr marL="2743200" indent="0">
+            <a:lvl7pPr marL="4319991" indent="0">
               <a:buNone/>
-              <a:defRPr sz="2000"/>
+              <a:defRPr sz="3150"/>
             </a:lvl7pPr>
-            <a:lvl8pPr marL="3200400" indent="0">
+            <a:lvl8pPr marL="5039990" indent="0">
               <a:buNone/>
-              <a:defRPr sz="2000"/>
+              <a:defRPr sz="3150"/>
             </a:lvl8pPr>
-            <a:lvl9pPr marL="3657600" indent="0">
+            <a:lvl9pPr marL="5759988" indent="0">
               <a:buNone/>
-              <a:defRPr sz="2000"/>
+              <a:defRPr sz="3150"/>
             </a:lvl9pPr>
           </a:lstStyle>
           <a:p>
-            <a:endParaRPr lang="en-AU"/>
+            <a:r>
+              <a:rPr lang="en-US"/>
+              <a:t>Click icon to add picture</a:t>
+            </a:r>
+            <a:endParaRPr lang="en-US" dirty="0"/>
           </a:p>
         </p:txBody>
       </p:sp>
       <p:sp>
         <p:nvSpPr>
-          <p:cNvPr id="4" name="Text Placeholder 3">
-            <a:extLst>
-              <a:ext uri="{FF2B5EF4-FFF2-40B4-BE49-F238E27FC236}">
-                <a16:creationId xmlns:a16="http://schemas.microsoft.com/office/drawing/2014/main" id="{C6C256F2-255C-4597-BB90-E8B7DAE9BB51}"/>
-              </a:ext>
-            </a:extLst>
-          </p:cNvPr>
+          <p:cNvPr id="4" name="Text Placeholder 3"/>
           <p:cNvSpPr>
             <a:spLocks noGrp="1"/>
           </p:cNvSpPr>
@@ -9027,8 +8700,8 @@
         </p:nvSpPr>
         <p:spPr>
           <a:xfrm>
-            <a:off x="839788" y="2057400"/>
-            <a:ext cx="3932237" cy="3811588"/>
+            <a:off x="991890" y="3239929"/>
+            <a:ext cx="4644444" cy="6002369"/>
           </a:xfrm>
         </p:spPr>
         <p:txBody>
@@ -9036,39 +8709,39 @@
           <a:lstStyle>
             <a:lvl1pPr marL="0" indent="0">
               <a:buNone/>
-              <a:defRPr sz="1600"/>
+              <a:defRPr sz="2520"/>
             </a:lvl1pPr>
-            <a:lvl2pPr marL="457200" indent="0">
+            <a:lvl2pPr marL="719999" indent="0">
               <a:buNone/>
-              <a:defRPr sz="1400"/>
+              <a:defRPr sz="2205"/>
             </a:lvl2pPr>
-            <a:lvl3pPr marL="914400" indent="0">
+            <a:lvl3pPr marL="1439997" indent="0">
               <a:buNone/>
-              <a:defRPr sz="1200"/>
+              <a:defRPr sz="1890"/>
             </a:lvl3pPr>
-            <a:lvl4pPr marL="1371600" indent="0">
+            <a:lvl4pPr marL="2159996" indent="0">
               <a:buNone/>
-              <a:defRPr sz="1000"/>
+              <a:defRPr sz="1575"/>
             </a:lvl4pPr>
-            <a:lvl5pPr marL="1828800" indent="0">
+            <a:lvl5pPr marL="2879994" indent="0">
               <a:buNone/>
-              <a:defRPr sz="1000"/>
+              <a:defRPr sz="1575"/>
             </a:lvl5pPr>
-            <a:lvl6pPr marL="2286000" indent="0">
+            <a:lvl6pPr marL="3599993" indent="0">
               <a:buNone/>
-              <a:defRPr sz="1000"/>
+              <a:defRPr sz="1575"/>
             </a:lvl6pPr>
-            <a:lvl7pPr marL="2743200" indent="0">
+            <a:lvl7pPr marL="4319991" indent="0">
               <a:buNone/>
-              <a:defRPr sz="1000"/>
+              <a:defRPr sz="1575"/>
             </a:lvl7pPr>
-            <a:lvl8pPr marL="3200400" indent="0">
+            <a:lvl8pPr marL="5039990" indent="0">
               <a:buNone/>
-              <a:defRPr sz="1000"/>
+              <a:defRPr sz="1575"/>
             </a:lvl8pPr>
-            <a:lvl9pPr marL="3657600" indent="0">
+            <a:lvl9pPr marL="5759988" indent="0">
               <a:buNone/>
-              <a:defRPr sz="1000"/>
+              <a:defRPr sz="1575"/>
             </a:lvl9pPr>
           </a:lstStyle>
           <a:p>
@@ -9082,13 +8755,7 @@
       </p:sp>
       <p:sp>
         <p:nvSpPr>
-          <p:cNvPr id="5" name="Date Placeholder 4">
-            <a:extLst>
-              <a:ext uri="{FF2B5EF4-FFF2-40B4-BE49-F238E27FC236}">
-                <a16:creationId xmlns:a16="http://schemas.microsoft.com/office/drawing/2014/main" id="{66CEC9C9-92CF-41F6-BC0D-B744EAC2D09B}"/>
-              </a:ext>
-            </a:extLst>
-          </p:cNvPr>
+          <p:cNvPr id="5" name="Date Placeholder 4"/>
           <p:cNvSpPr>
             <a:spLocks noGrp="1"/>
           </p:cNvSpPr>
@@ -9103,7 +8770,7 @@
           <a:p>
             <a:fld id="{85C9B555-08B4-40A8-BBAB-879833AA5A7D}" type="datetimeFigureOut">
               <a:rPr lang="en-AU" smtClean="0"/>
-              <a:t>4/02/2022</a:t>
+              <a:t>24/02/2022</a:t>
             </a:fld>
             <a:endParaRPr lang="en-AU"/>
           </a:p>
@@ -9111,13 +8778,7 @@
       </p:sp>
       <p:sp>
         <p:nvSpPr>
-          <p:cNvPr id="6" name="Footer Placeholder 5">
-            <a:extLst>
-              <a:ext uri="{FF2B5EF4-FFF2-40B4-BE49-F238E27FC236}">
-                <a16:creationId xmlns:a16="http://schemas.microsoft.com/office/drawing/2014/main" id="{25AFEAD7-27B3-427F-8187-32FEF737B677}"/>
-              </a:ext>
-            </a:extLst>
-          </p:cNvPr>
+          <p:cNvPr id="6" name="Footer Placeholder 5"/>
           <p:cNvSpPr>
             <a:spLocks noGrp="1"/>
           </p:cNvSpPr>
@@ -9136,13 +8797,7 @@
       </p:sp>
       <p:sp>
         <p:nvSpPr>
-          <p:cNvPr id="7" name="Slide Number Placeholder 6">
-            <a:extLst>
-              <a:ext uri="{FF2B5EF4-FFF2-40B4-BE49-F238E27FC236}">
-                <a16:creationId xmlns:a16="http://schemas.microsoft.com/office/drawing/2014/main" id="{127701D9-658B-48B9-BEB5-B586FEB0A71F}"/>
-              </a:ext>
-            </a:extLst>
-          </p:cNvPr>
+          <p:cNvPr id="7" name="Slide Number Placeholder 6"/>
           <p:cNvSpPr>
             <a:spLocks noGrp="1"/>
           </p:cNvSpPr>
@@ -9166,7 +8821,7 @@
     </p:spTree>
     <p:extLst>
       <p:ext uri="{BB962C8B-B14F-4D97-AF65-F5344CB8AC3E}">
-        <p14:creationId xmlns:p14="http://schemas.microsoft.com/office/powerpoint/2010/main" val="3845645255"/>
+        <p14:creationId xmlns:p14="http://schemas.microsoft.com/office/powerpoint/2010/main" val="1081984301"/>
       </p:ext>
     </p:extLst>
   </p:cSld>
@@ -9200,13 +8855,7 @@
       </p:grpSpPr>
       <p:sp>
         <p:nvSpPr>
-          <p:cNvPr id="2" name="Title Placeholder 1">
-            <a:extLst>
-              <a:ext uri="{FF2B5EF4-FFF2-40B4-BE49-F238E27FC236}">
-                <a16:creationId xmlns:a16="http://schemas.microsoft.com/office/drawing/2014/main" id="{04299B2A-FA55-443B-9D77-9F045E4B2B47}"/>
-              </a:ext>
-            </a:extLst>
-          </p:cNvPr>
+          <p:cNvPr id="2" name="Title Placeholder 1"/>
           <p:cNvSpPr>
             <a:spLocks noGrp="1"/>
           </p:cNvSpPr>
@@ -9216,8 +8865,8 @@
         </p:nvSpPr>
         <p:spPr>
           <a:xfrm>
-            <a:off x="838200" y="365125"/>
-            <a:ext cx="10515600" cy="1325563"/>
+            <a:off x="990015" y="574990"/>
+            <a:ext cx="12420184" cy="2087455"/>
           </a:xfrm>
           <a:prstGeom prst="rect">
             <a:avLst/>
@@ -9233,19 +8882,13 @@
               <a:rPr lang="en-US"/>
               <a:t>Click to edit Master title style</a:t>
             </a:r>
-            <a:endParaRPr lang="en-AU"/>
+            <a:endParaRPr lang="en-US" dirty="0"/>
           </a:p>
         </p:txBody>
       </p:sp>
       <p:sp>
         <p:nvSpPr>
-          <p:cNvPr id="3" name="Text Placeholder 2">
-            <a:extLst>
-              <a:ext uri="{FF2B5EF4-FFF2-40B4-BE49-F238E27FC236}">
-                <a16:creationId xmlns:a16="http://schemas.microsoft.com/office/drawing/2014/main" id="{B86CB818-C445-499A-A081-43041E2D12F6}"/>
-              </a:ext>
-            </a:extLst>
-          </p:cNvPr>
+          <p:cNvPr id="3" name="Text Placeholder 2"/>
           <p:cNvSpPr>
             <a:spLocks noGrp="1"/>
           </p:cNvSpPr>
@@ -9255,8 +8898,8 @@
         </p:nvSpPr>
         <p:spPr>
           <a:xfrm>
-            <a:off x="838200" y="1825625"/>
-            <a:ext cx="10515600" cy="4351338"/>
+            <a:off x="990015" y="2874937"/>
+            <a:ext cx="12420184" cy="6852350"/>
           </a:xfrm>
           <a:prstGeom prst="rect">
             <a:avLst/>
@@ -9301,19 +8944,13 @@
               <a:rPr lang="en-US"/>
               <a:t>Fifth level</a:t>
             </a:r>
-            <a:endParaRPr lang="en-AU"/>
+            <a:endParaRPr lang="en-US" dirty="0"/>
           </a:p>
         </p:txBody>
       </p:sp>
       <p:sp>
         <p:nvSpPr>
-          <p:cNvPr id="4" name="Date Placeholder 3">
-            <a:extLst>
-              <a:ext uri="{FF2B5EF4-FFF2-40B4-BE49-F238E27FC236}">
-                <a16:creationId xmlns:a16="http://schemas.microsoft.com/office/drawing/2014/main" id="{CB451B94-558A-4E04-99BF-226B38399804}"/>
-              </a:ext>
-            </a:extLst>
-          </p:cNvPr>
+          <p:cNvPr id="4" name="Date Placeholder 3"/>
           <p:cNvSpPr>
             <a:spLocks noGrp="1"/>
           </p:cNvSpPr>
@@ -9323,8 +8960,8 @@
         </p:nvSpPr>
         <p:spPr>
           <a:xfrm>
-            <a:off x="838200" y="6356350"/>
-            <a:ext cx="2743200" cy="365125"/>
+            <a:off x="990015" y="10009783"/>
+            <a:ext cx="3240048" cy="574987"/>
           </a:xfrm>
           <a:prstGeom prst="rect">
             <a:avLst/>
@@ -9334,7 +8971,7 @@
           <a:bodyPr vert="horz" lIns="91440" tIns="45720" rIns="91440" bIns="45720" rtlCol="0" anchor="ctr"/>
           <a:lstStyle>
             <a:lvl1pPr algn="l">
-              <a:defRPr sz="1200">
+              <a:defRPr sz="1890">
                 <a:solidFill>
                   <a:schemeClr val="tx1">
                     <a:tint val="75000"/>
@@ -9346,7 +8983,7 @@
           <a:p>
             <a:fld id="{85C9B555-08B4-40A8-BBAB-879833AA5A7D}" type="datetimeFigureOut">
               <a:rPr lang="en-AU" smtClean="0"/>
-              <a:t>4/02/2022</a:t>
+              <a:t>24/02/2022</a:t>
             </a:fld>
             <a:endParaRPr lang="en-AU"/>
           </a:p>
@@ -9354,13 +8991,7 @@
       </p:sp>
       <p:sp>
         <p:nvSpPr>
-          <p:cNvPr id="5" name="Footer Placeholder 4">
-            <a:extLst>
-              <a:ext uri="{FF2B5EF4-FFF2-40B4-BE49-F238E27FC236}">
-                <a16:creationId xmlns:a16="http://schemas.microsoft.com/office/drawing/2014/main" id="{2B937555-AEDA-42D0-84CE-5621A8ADF6E3}"/>
-              </a:ext>
-            </a:extLst>
-          </p:cNvPr>
+          <p:cNvPr id="5" name="Footer Placeholder 4"/>
           <p:cNvSpPr>
             <a:spLocks noGrp="1"/>
           </p:cNvSpPr>
@@ -9370,8 +9001,8 @@
         </p:nvSpPr>
         <p:spPr>
           <a:xfrm>
-            <a:off x="4038600" y="6356350"/>
-            <a:ext cx="4114800" cy="365125"/>
+            <a:off x="4770071" y="10009783"/>
+            <a:ext cx="4860072" cy="574987"/>
           </a:xfrm>
           <a:prstGeom prst="rect">
             <a:avLst/>
@@ -9381,7 +9012,7 @@
           <a:bodyPr vert="horz" lIns="91440" tIns="45720" rIns="91440" bIns="45720" rtlCol="0" anchor="ctr"/>
           <a:lstStyle>
             <a:lvl1pPr algn="ctr">
-              <a:defRPr sz="1200">
+              <a:defRPr sz="1890">
                 <a:solidFill>
                   <a:schemeClr val="tx1">
                     <a:tint val="75000"/>
@@ -9397,13 +9028,7 @@
       </p:sp>
       <p:sp>
         <p:nvSpPr>
-          <p:cNvPr id="6" name="Slide Number Placeholder 5">
-            <a:extLst>
-              <a:ext uri="{FF2B5EF4-FFF2-40B4-BE49-F238E27FC236}">
-                <a16:creationId xmlns:a16="http://schemas.microsoft.com/office/drawing/2014/main" id="{863C4353-81EC-433E-AD5F-EB3AFD66FED7}"/>
-              </a:ext>
-            </a:extLst>
-          </p:cNvPr>
+          <p:cNvPr id="6" name="Slide Number Placeholder 5"/>
           <p:cNvSpPr>
             <a:spLocks noGrp="1"/>
           </p:cNvSpPr>
@@ -9413,8 +9038,8 @@
         </p:nvSpPr>
         <p:spPr>
           <a:xfrm>
-            <a:off x="8610600" y="6356350"/>
-            <a:ext cx="2743200" cy="365125"/>
+            <a:off x="10170150" y="10009783"/>
+            <a:ext cx="3240048" cy="574987"/>
           </a:xfrm>
           <a:prstGeom prst="rect">
             <a:avLst/>
@@ -9424,7 +9049,7 @@
           <a:bodyPr vert="horz" lIns="91440" tIns="45720" rIns="91440" bIns="45720" rtlCol="0" anchor="ctr"/>
           <a:lstStyle>
             <a:lvl1pPr algn="r">
-              <a:defRPr sz="1200">
+              <a:defRPr sz="1890">
                 <a:solidFill>
                   <a:schemeClr val="tx1">
                     <a:tint val="75000"/>
@@ -9445,27 +9070,27 @@
     </p:spTree>
     <p:extLst>
       <p:ext uri="{BB962C8B-B14F-4D97-AF65-F5344CB8AC3E}">
-        <p14:creationId xmlns:p14="http://schemas.microsoft.com/office/powerpoint/2010/main" val="3449132200"/>
+        <p14:creationId xmlns:p14="http://schemas.microsoft.com/office/powerpoint/2010/main" val="2747671064"/>
       </p:ext>
     </p:extLst>
   </p:cSld>
   <p:clrMap bg1="lt1" tx1="dk1" bg2="lt2" tx2="dk2" accent1="accent1" accent2="accent2" accent3="accent3" accent4="accent4" accent5="accent5" accent6="accent6" hlink="hlink" folHlink="folHlink"/>
   <p:sldLayoutIdLst>
-    <p:sldLayoutId id="2147483649" r:id="rId1"/>
-    <p:sldLayoutId id="2147483650" r:id="rId2"/>
-    <p:sldLayoutId id="2147483651" r:id="rId3"/>
-    <p:sldLayoutId id="2147483652" r:id="rId4"/>
-    <p:sldLayoutId id="2147483653" r:id="rId5"/>
-    <p:sldLayoutId id="2147483654" r:id="rId6"/>
-    <p:sldLayoutId id="2147483655" r:id="rId7"/>
-    <p:sldLayoutId id="2147483656" r:id="rId8"/>
-    <p:sldLayoutId id="2147483657" r:id="rId9"/>
-    <p:sldLayoutId id="2147483658" r:id="rId10"/>
-    <p:sldLayoutId id="2147483659" r:id="rId11"/>
+    <p:sldLayoutId id="2147483673" r:id="rId1"/>
+    <p:sldLayoutId id="2147483674" r:id="rId2"/>
+    <p:sldLayoutId id="2147483675" r:id="rId3"/>
+    <p:sldLayoutId id="2147483676" r:id="rId4"/>
+    <p:sldLayoutId id="2147483677" r:id="rId5"/>
+    <p:sldLayoutId id="2147483678" r:id="rId6"/>
+    <p:sldLayoutId id="2147483679" r:id="rId7"/>
+    <p:sldLayoutId id="2147483680" r:id="rId8"/>
+    <p:sldLayoutId id="2147483681" r:id="rId9"/>
+    <p:sldLayoutId id="2147483682" r:id="rId10"/>
+    <p:sldLayoutId id="2147483683" r:id="rId11"/>
   </p:sldLayoutIdLst>
   <p:txStyles>
     <p:titleStyle>
-      <a:lvl1pPr algn="l" defTabSz="914400" rtl="0" eaLnBrk="1" latinLnBrk="0" hangingPunct="1">
+      <a:lvl1pPr algn="l" defTabSz="1439997" rtl="0" eaLnBrk="1" latinLnBrk="0" hangingPunct="1">
         <a:lnSpc>
           <a:spcPct val="90000"/>
         </a:lnSpc>
@@ -9473,7 +9098,7 @@
           <a:spcPct val="0"/>
         </a:spcBef>
         <a:buNone/>
-        <a:defRPr sz="4400" kern="1200">
+        <a:defRPr sz="6929" kern="1200">
           <a:solidFill>
             <a:schemeClr val="tx1"/>
           </a:solidFill>
@@ -9484,16 +9109,16 @@
       </a:lvl1pPr>
     </p:titleStyle>
     <p:bodyStyle>
-      <a:lvl1pPr marL="228600" indent="-228600" algn="l" defTabSz="914400" rtl="0" eaLnBrk="1" latinLnBrk="0" hangingPunct="1">
+      <a:lvl1pPr marL="359999" indent="-359999" algn="l" defTabSz="1439997" rtl="0" eaLnBrk="1" latinLnBrk="0" hangingPunct="1">
         <a:lnSpc>
           <a:spcPct val="90000"/>
         </a:lnSpc>
         <a:spcBef>
-          <a:spcPts val="1000"/>
+          <a:spcPts val="1575"/>
         </a:spcBef>
         <a:buFont typeface="Arial" panose="020B0604020202020204" pitchFamily="34" charset="0"/>
         <a:buChar char="•"/>
-        <a:defRPr sz="2800" kern="1200">
+        <a:defRPr sz="4409" kern="1200">
           <a:solidFill>
             <a:schemeClr val="tx1"/>
           </a:solidFill>
@@ -9502,16 +9127,16 @@
           <a:cs typeface="+mn-cs"/>
         </a:defRPr>
       </a:lvl1pPr>
-      <a:lvl2pPr marL="685800" indent="-228600" algn="l" defTabSz="914400" rtl="0" eaLnBrk="1" latinLnBrk="0" hangingPunct="1">
+      <a:lvl2pPr marL="1079998" indent="-359999" algn="l" defTabSz="1439997" rtl="0" eaLnBrk="1" latinLnBrk="0" hangingPunct="1">
         <a:lnSpc>
           <a:spcPct val="90000"/>
         </a:lnSpc>
         <a:spcBef>
-          <a:spcPts val="500"/>
+          <a:spcPts val="787"/>
         </a:spcBef>
         <a:buFont typeface="Arial" panose="020B0604020202020204" pitchFamily="34" charset="0"/>
         <a:buChar char="•"/>
-        <a:defRPr sz="2400" kern="1200">
+        <a:defRPr sz="3780" kern="1200">
           <a:solidFill>
             <a:schemeClr val="tx1"/>
           </a:solidFill>
@@ -9520,16 +9145,16 @@
           <a:cs typeface="+mn-cs"/>
         </a:defRPr>
       </a:lvl2pPr>
-      <a:lvl3pPr marL="1143000" indent="-228600" algn="l" defTabSz="914400" rtl="0" eaLnBrk="1" latinLnBrk="0" hangingPunct="1">
+      <a:lvl3pPr marL="1799996" indent="-359999" algn="l" defTabSz="1439997" rtl="0" eaLnBrk="1" latinLnBrk="0" hangingPunct="1">
         <a:lnSpc>
           <a:spcPct val="90000"/>
         </a:lnSpc>
         <a:spcBef>
-          <a:spcPts val="500"/>
+          <a:spcPts val="787"/>
         </a:spcBef>
         <a:buFont typeface="Arial" panose="020B0604020202020204" pitchFamily="34" charset="0"/>
         <a:buChar char="•"/>
-        <a:defRPr sz="2000" kern="1200">
+        <a:defRPr sz="3150" kern="1200">
           <a:solidFill>
             <a:schemeClr val="tx1"/>
           </a:solidFill>
@@ -9538,16 +9163,16 @@
           <a:cs typeface="+mn-cs"/>
         </a:defRPr>
       </a:lvl3pPr>
-      <a:lvl4pPr marL="1600200" indent="-228600" algn="l" defTabSz="914400" rtl="0" eaLnBrk="1" latinLnBrk="0" hangingPunct="1">
+      <a:lvl4pPr marL="2519995" indent="-359999" algn="l" defTabSz="1439997" rtl="0" eaLnBrk="1" latinLnBrk="0" hangingPunct="1">
         <a:lnSpc>
           <a:spcPct val="90000"/>
         </a:lnSpc>
         <a:spcBef>
-          <a:spcPts val="500"/>
+          <a:spcPts val="787"/>
         </a:spcBef>
         <a:buFont typeface="Arial" panose="020B0604020202020204" pitchFamily="34" charset="0"/>
         <a:buChar char="•"/>
-        <a:defRPr sz="1800" kern="1200">
+        <a:defRPr sz="2835" kern="1200">
           <a:solidFill>
             <a:schemeClr val="tx1"/>
           </a:solidFill>
@@ -9556,16 +9181,16 @@
           <a:cs typeface="+mn-cs"/>
         </a:defRPr>
       </a:lvl4pPr>
-      <a:lvl5pPr marL="2057400" indent="-228600" algn="l" defTabSz="914400" rtl="0" eaLnBrk="1" latinLnBrk="0" hangingPunct="1">
+      <a:lvl5pPr marL="3239994" indent="-359999" algn="l" defTabSz="1439997" rtl="0" eaLnBrk="1" latinLnBrk="0" hangingPunct="1">
         <a:lnSpc>
           <a:spcPct val="90000"/>
         </a:lnSpc>
         <a:spcBef>
-          <a:spcPts val="500"/>
+          <a:spcPts val="787"/>
         </a:spcBef>
         <a:buFont typeface="Arial" panose="020B0604020202020204" pitchFamily="34" charset="0"/>
         <a:buChar char="•"/>
-        <a:defRPr sz="1800" kern="1200">
+        <a:defRPr sz="2835" kern="1200">
           <a:solidFill>
             <a:schemeClr val="tx1"/>
           </a:solidFill>
@@ -9574,16 +9199,16 @@
           <a:cs typeface="+mn-cs"/>
         </a:defRPr>
       </a:lvl5pPr>
-      <a:lvl6pPr marL="2514600" indent="-228600" algn="l" defTabSz="914400" rtl="0" eaLnBrk="1" latinLnBrk="0" hangingPunct="1">
+      <a:lvl6pPr marL="3959992" indent="-359999" algn="l" defTabSz="1439997" rtl="0" eaLnBrk="1" latinLnBrk="0" hangingPunct="1">
         <a:lnSpc>
           <a:spcPct val="90000"/>
         </a:lnSpc>
         <a:spcBef>
-          <a:spcPts val="500"/>
+          <a:spcPts val="787"/>
         </a:spcBef>
         <a:buFont typeface="Arial" panose="020B0604020202020204" pitchFamily="34" charset="0"/>
         <a:buChar char="•"/>
-        <a:defRPr sz="1800" kern="1200">
+        <a:defRPr sz="2835" kern="1200">
           <a:solidFill>
             <a:schemeClr val="tx1"/>
           </a:solidFill>
@@ -9592,16 +9217,16 @@
           <a:cs typeface="+mn-cs"/>
         </a:defRPr>
       </a:lvl6pPr>
-      <a:lvl7pPr marL="2971800" indent="-228600" algn="l" defTabSz="914400" rtl="0" eaLnBrk="1" latinLnBrk="0" hangingPunct="1">
+      <a:lvl7pPr marL="4679991" indent="-359999" algn="l" defTabSz="1439997" rtl="0" eaLnBrk="1" latinLnBrk="0" hangingPunct="1">
         <a:lnSpc>
           <a:spcPct val="90000"/>
         </a:lnSpc>
         <a:spcBef>
-          <a:spcPts val="500"/>
+          <a:spcPts val="787"/>
         </a:spcBef>
         <a:buFont typeface="Arial" panose="020B0604020202020204" pitchFamily="34" charset="0"/>
         <a:buChar char="•"/>
-        <a:defRPr sz="1800" kern="1200">
+        <a:defRPr sz="2835" kern="1200">
           <a:solidFill>
             <a:schemeClr val="tx1"/>
           </a:solidFill>
@@ -9610,16 +9235,16 @@
           <a:cs typeface="+mn-cs"/>
         </a:defRPr>
       </a:lvl7pPr>
-      <a:lvl8pPr marL="3429000" indent="-228600" algn="l" defTabSz="914400" rtl="0" eaLnBrk="1" latinLnBrk="0" hangingPunct="1">
+      <a:lvl8pPr marL="5399989" indent="-359999" algn="l" defTabSz="1439997" rtl="0" eaLnBrk="1" latinLnBrk="0" hangingPunct="1">
         <a:lnSpc>
           <a:spcPct val="90000"/>
         </a:lnSpc>
         <a:spcBef>
-          <a:spcPts val="500"/>
+          <a:spcPts val="787"/>
         </a:spcBef>
         <a:buFont typeface="Arial" panose="020B0604020202020204" pitchFamily="34" charset="0"/>
         <a:buChar char="•"/>
-        <a:defRPr sz="1800" kern="1200">
+        <a:defRPr sz="2835" kern="1200">
           <a:solidFill>
             <a:schemeClr val="tx1"/>
           </a:solidFill>
@@ -9628,16 +9253,16 @@
           <a:cs typeface="+mn-cs"/>
         </a:defRPr>
       </a:lvl8pPr>
-      <a:lvl9pPr marL="3886200" indent="-228600" algn="l" defTabSz="914400" rtl="0" eaLnBrk="1" latinLnBrk="0" hangingPunct="1">
+      <a:lvl9pPr marL="6119988" indent="-359999" algn="l" defTabSz="1439997" rtl="0" eaLnBrk="1" latinLnBrk="0" hangingPunct="1">
         <a:lnSpc>
           <a:spcPct val="90000"/>
         </a:lnSpc>
         <a:spcBef>
-          <a:spcPts val="500"/>
+          <a:spcPts val="787"/>
         </a:spcBef>
         <a:buFont typeface="Arial" panose="020B0604020202020204" pitchFamily="34" charset="0"/>
         <a:buChar char="•"/>
-        <a:defRPr sz="1800" kern="1200">
+        <a:defRPr sz="2835" kern="1200">
           <a:solidFill>
             <a:schemeClr val="tx1"/>
           </a:solidFill>
@@ -9651,8 +9276,8 @@
       <a:defPPr>
         <a:defRPr lang="en-US"/>
       </a:defPPr>
-      <a:lvl1pPr marL="0" algn="l" defTabSz="914400" rtl="0" eaLnBrk="1" latinLnBrk="0" hangingPunct="1">
-        <a:defRPr sz="1800" kern="1200">
+      <a:lvl1pPr marL="0" algn="l" defTabSz="1439997" rtl="0" eaLnBrk="1" latinLnBrk="0" hangingPunct="1">
+        <a:defRPr sz="2835" kern="1200">
           <a:solidFill>
             <a:schemeClr val="tx1"/>
           </a:solidFill>
@@ -9661,8 +9286,8 @@
           <a:cs typeface="+mn-cs"/>
         </a:defRPr>
       </a:lvl1pPr>
-      <a:lvl2pPr marL="457200" algn="l" defTabSz="914400" rtl="0" eaLnBrk="1" latinLnBrk="0" hangingPunct="1">
-        <a:defRPr sz="1800" kern="1200">
+      <a:lvl2pPr marL="719999" algn="l" defTabSz="1439997" rtl="0" eaLnBrk="1" latinLnBrk="0" hangingPunct="1">
+        <a:defRPr sz="2835" kern="1200">
           <a:solidFill>
             <a:schemeClr val="tx1"/>
           </a:solidFill>
@@ -9671,8 +9296,8 @@
           <a:cs typeface="+mn-cs"/>
         </a:defRPr>
       </a:lvl2pPr>
-      <a:lvl3pPr marL="914400" algn="l" defTabSz="914400" rtl="0" eaLnBrk="1" latinLnBrk="0" hangingPunct="1">
-        <a:defRPr sz="1800" kern="1200">
+      <a:lvl3pPr marL="1439997" algn="l" defTabSz="1439997" rtl="0" eaLnBrk="1" latinLnBrk="0" hangingPunct="1">
+        <a:defRPr sz="2835" kern="1200">
           <a:solidFill>
             <a:schemeClr val="tx1"/>
           </a:solidFill>
@@ -9681,8 +9306,8 @@
           <a:cs typeface="+mn-cs"/>
         </a:defRPr>
       </a:lvl3pPr>
-      <a:lvl4pPr marL="1371600" algn="l" defTabSz="914400" rtl="0" eaLnBrk="1" latinLnBrk="0" hangingPunct="1">
-        <a:defRPr sz="1800" kern="1200">
+      <a:lvl4pPr marL="2159996" algn="l" defTabSz="1439997" rtl="0" eaLnBrk="1" latinLnBrk="0" hangingPunct="1">
+        <a:defRPr sz="2835" kern="1200">
           <a:solidFill>
             <a:schemeClr val="tx1"/>
           </a:solidFill>
@@ -9691,8 +9316,8 @@
           <a:cs typeface="+mn-cs"/>
         </a:defRPr>
       </a:lvl4pPr>
-      <a:lvl5pPr marL="1828800" algn="l" defTabSz="914400" rtl="0" eaLnBrk="1" latinLnBrk="0" hangingPunct="1">
-        <a:defRPr sz="1800" kern="1200">
+      <a:lvl5pPr marL="2879994" algn="l" defTabSz="1439997" rtl="0" eaLnBrk="1" latinLnBrk="0" hangingPunct="1">
+        <a:defRPr sz="2835" kern="1200">
           <a:solidFill>
             <a:schemeClr val="tx1"/>
           </a:solidFill>
@@ -9701,8 +9326,8 @@
           <a:cs typeface="+mn-cs"/>
         </a:defRPr>
       </a:lvl5pPr>
-      <a:lvl6pPr marL="2286000" algn="l" defTabSz="914400" rtl="0" eaLnBrk="1" latinLnBrk="0" hangingPunct="1">
-        <a:defRPr sz="1800" kern="1200">
+      <a:lvl6pPr marL="3599993" algn="l" defTabSz="1439997" rtl="0" eaLnBrk="1" latinLnBrk="0" hangingPunct="1">
+        <a:defRPr sz="2835" kern="1200">
           <a:solidFill>
             <a:schemeClr val="tx1"/>
           </a:solidFill>
@@ -9711,8 +9336,8 @@
           <a:cs typeface="+mn-cs"/>
         </a:defRPr>
       </a:lvl6pPr>
-      <a:lvl7pPr marL="2743200" algn="l" defTabSz="914400" rtl="0" eaLnBrk="1" latinLnBrk="0" hangingPunct="1">
-        <a:defRPr sz="1800" kern="1200">
+      <a:lvl7pPr marL="4319991" algn="l" defTabSz="1439997" rtl="0" eaLnBrk="1" latinLnBrk="0" hangingPunct="1">
+        <a:defRPr sz="2835" kern="1200">
           <a:solidFill>
             <a:schemeClr val="tx1"/>
           </a:solidFill>
@@ -9721,8 +9346,8 @@
           <a:cs typeface="+mn-cs"/>
         </a:defRPr>
       </a:lvl7pPr>
-      <a:lvl8pPr marL="3200400" algn="l" defTabSz="914400" rtl="0" eaLnBrk="1" latinLnBrk="0" hangingPunct="1">
-        <a:defRPr sz="1800" kern="1200">
+      <a:lvl8pPr marL="5039990" algn="l" defTabSz="1439997" rtl="0" eaLnBrk="1" latinLnBrk="0" hangingPunct="1">
+        <a:defRPr sz="2835" kern="1200">
           <a:solidFill>
             <a:schemeClr val="tx1"/>
           </a:solidFill>
@@ -9731,8 +9356,8 @@
           <a:cs typeface="+mn-cs"/>
         </a:defRPr>
       </a:lvl8pPr>
-      <a:lvl9pPr marL="3657600" algn="l" defTabSz="914400" rtl="0" eaLnBrk="1" latinLnBrk="0" hangingPunct="1">
-        <a:defRPr sz="1800" kern="1200">
+      <a:lvl9pPr marL="5759988" algn="l" defTabSz="1439997" rtl="0" eaLnBrk="1" latinLnBrk="0" hangingPunct="1">
+        <a:defRPr sz="2835" kern="1200">
           <a:solidFill>
             <a:schemeClr val="tx1"/>
           </a:solidFill>
@@ -9777,7 +9402,7 @@
         </p:nvSpPr>
         <p:spPr>
           <a:xfrm>
-            <a:off x="3266984" y="1119514"/>
+            <a:off x="4371093" y="3090395"/>
             <a:ext cx="2059619" cy="159798"/>
           </a:xfrm>
           <a:prstGeom prst="rect">
@@ -9823,7 +9448,7 @@
         </p:nvSpPr>
         <p:spPr>
           <a:xfrm>
-            <a:off x="3266984" y="1279312"/>
+            <a:off x="4371093" y="3250196"/>
             <a:ext cx="2059619" cy="1056447"/>
           </a:xfrm>
           <a:prstGeom prst="rect">
@@ -9869,7 +9494,7 @@
         </p:nvSpPr>
         <p:spPr>
           <a:xfrm>
-            <a:off x="3639845" y="1286243"/>
+            <a:off x="4743954" y="3257124"/>
             <a:ext cx="1313895" cy="2418428"/>
           </a:xfrm>
           <a:custGeom>
@@ -9966,7 +9591,7 @@
         </p:nvSpPr>
         <p:spPr>
           <a:xfrm>
-            <a:off x="3266982" y="2927221"/>
+            <a:off x="4371091" y="4898105"/>
             <a:ext cx="2059619" cy="852261"/>
           </a:xfrm>
           <a:prstGeom prst="rect">
@@ -10012,7 +9637,7 @@
         </p:nvSpPr>
         <p:spPr>
           <a:xfrm>
-            <a:off x="3875103" y="1762363"/>
+            <a:off x="4979209" y="3733247"/>
             <a:ext cx="843378" cy="3733061"/>
           </a:xfrm>
           <a:prstGeom prst="triangle">
@@ -10064,7 +9689,7 @@
         </p:nvSpPr>
         <p:spPr>
           <a:xfrm>
-            <a:off x="3213817" y="5116848"/>
+            <a:off x="4317924" y="7087731"/>
             <a:ext cx="2175030" cy="1686757"/>
           </a:xfrm>
           <a:prstGeom prst="rect">
@@ -10113,7 +9738,7 @@
         </p:nvCxnSpPr>
         <p:spPr>
           <a:xfrm>
-            <a:off x="4296795" y="560221"/>
+            <a:off x="5400904" y="2531102"/>
             <a:ext cx="4537" cy="6243384"/>
           </a:xfrm>
           <a:prstGeom prst="line">
@@ -10159,7 +9784,7 @@
         </p:nvCxnSpPr>
         <p:spPr>
           <a:xfrm flipH="1">
-            <a:off x="3213817" y="5960227"/>
+            <a:off x="4317924" y="7931108"/>
             <a:ext cx="2175030" cy="0"/>
           </a:xfrm>
           <a:prstGeom prst="line">
@@ -10201,7 +9826,7 @@
         </p:nvSpPr>
         <p:spPr>
           <a:xfrm>
-            <a:off x="3882693" y="564791"/>
+            <a:off x="4986799" y="2535672"/>
             <a:ext cx="454412" cy="369332"/>
           </a:xfrm>
           <a:prstGeom prst="rect">
@@ -10249,7 +9874,7 @@
         </p:nvCxnSpPr>
         <p:spPr>
           <a:xfrm>
-            <a:off x="4215504" y="581487"/>
+            <a:off x="5319610" y="2552368"/>
             <a:ext cx="0" cy="461434"/>
           </a:xfrm>
           <a:prstGeom prst="straightConnector1">
@@ -10291,7 +9916,7 @@
         </p:nvSpPr>
         <p:spPr>
           <a:xfrm>
-            <a:off x="5326601" y="1014747"/>
+            <a:off x="6430709" y="2985628"/>
             <a:ext cx="1903021" cy="369332"/>
           </a:xfrm>
           <a:prstGeom prst="rect">
@@ -10327,7 +9952,7 @@
         </p:nvSpPr>
         <p:spPr>
           <a:xfrm>
-            <a:off x="5384310" y="1622869"/>
+            <a:off x="6488418" y="3593750"/>
             <a:ext cx="1903021" cy="369332"/>
           </a:xfrm>
           <a:prstGeom prst="rect">
@@ -10363,7 +9988,7 @@
         </p:nvSpPr>
         <p:spPr>
           <a:xfrm>
-            <a:off x="5384310" y="3068828"/>
+            <a:off x="6488418" y="5039711"/>
             <a:ext cx="1903021" cy="646331"/>
           </a:xfrm>
           <a:prstGeom prst="rect">
@@ -10401,7 +10026,7 @@
         </p:nvCxnSpPr>
         <p:spPr>
           <a:xfrm>
-            <a:off x="4170253" y="2927221"/>
+            <a:off x="5274359" y="4898102"/>
             <a:ext cx="266700" cy="0"/>
           </a:xfrm>
           <a:prstGeom prst="straightConnector1">
@@ -10446,7 +10071,7 @@
         </p:nvCxnSpPr>
         <p:spPr>
           <a:xfrm>
-            <a:off x="4084525" y="3779482"/>
+            <a:off x="5188634" y="5750363"/>
             <a:ext cx="442917" cy="0"/>
           </a:xfrm>
           <a:prstGeom prst="straightConnector1">
@@ -10491,7 +10116,7 @@
         </p:nvCxnSpPr>
         <p:spPr>
           <a:xfrm>
-            <a:off x="3213817" y="2909950"/>
+            <a:off x="4317923" y="4880834"/>
             <a:ext cx="0" cy="874295"/>
           </a:xfrm>
           <a:prstGeom prst="straightConnector1">
@@ -10534,7 +10159,7 @@
         </p:nvSpPr>
         <p:spPr>
           <a:xfrm>
-            <a:off x="5384310" y="5534366"/>
+            <a:off x="6488418" y="7505247"/>
             <a:ext cx="1903021" cy="369332"/>
           </a:xfrm>
           <a:prstGeom prst="rect">
@@ -10570,7 +10195,7 @@
         </p:nvSpPr>
         <p:spPr>
           <a:xfrm>
-            <a:off x="4271605" y="2592313"/>
+            <a:off x="5375714" y="4563195"/>
             <a:ext cx="2777345" cy="369332"/>
           </a:xfrm>
           <a:prstGeom prst="rect">
@@ -10614,7 +10239,7 @@
         </p:nvSpPr>
         <p:spPr>
           <a:xfrm>
-            <a:off x="4241989" y="3772674"/>
+            <a:off x="5346098" y="5743558"/>
             <a:ext cx="2777345" cy="646331"/>
           </a:xfrm>
           <a:prstGeom prst="rect">
@@ -10658,7 +10283,7 @@
         </p:nvSpPr>
         <p:spPr>
           <a:xfrm>
-            <a:off x="2222597" y="2631387"/>
+            <a:off x="3326706" y="4602270"/>
             <a:ext cx="1206779" cy="646331"/>
           </a:xfrm>
           <a:prstGeom prst="rect">
@@ -10702,7 +10327,7 @@
         </p:nvSpPr>
         <p:spPr>
           <a:xfrm>
-            <a:off x="3038201" y="-62182"/>
+            <a:off x="4142309" y="1908699"/>
             <a:ext cx="3831077" cy="923330"/>
           </a:xfrm>
           <a:prstGeom prst="rect">
@@ -10809,6 +10434,1153 @@
           <a:chExt cx="0" cy="0"/>
         </a:xfrm>
       </p:grpSpPr>
+      <p:grpSp>
+        <p:nvGrpSpPr>
+          <p:cNvPr id="28" name="Group 27">
+            <a:extLst>
+              <a:ext uri="{FF2B5EF4-FFF2-40B4-BE49-F238E27FC236}">
+                <a16:creationId xmlns:a16="http://schemas.microsoft.com/office/drawing/2014/main" id="{25FF19F3-A77C-4645-9618-E76E20AE47CC}"/>
+              </a:ext>
+            </a:extLst>
+          </p:cNvPr>
+          <p:cNvGrpSpPr/>
+          <p:nvPr/>
+        </p:nvGrpSpPr>
+        <p:grpSpPr>
+          <a:xfrm>
+            <a:off x="-48512" y="683050"/>
+            <a:ext cx="5064734" cy="6865789"/>
+            <a:chOff x="-73912" y="92599"/>
+            <a:chExt cx="5064734" cy="6865789"/>
+          </a:xfrm>
+        </p:grpSpPr>
+        <p:sp>
+          <p:nvSpPr>
+            <p:cNvPr id="4" name="Rectangle 3">
+              <a:extLst>
+                <a:ext uri="{FF2B5EF4-FFF2-40B4-BE49-F238E27FC236}">
+                  <a16:creationId xmlns:a16="http://schemas.microsoft.com/office/drawing/2014/main" id="{6CFBFB07-8181-4BA4-ADE4-FBF335BECAF0}"/>
+                </a:ext>
+              </a:extLst>
+            </p:cNvPr>
+            <p:cNvSpPr/>
+            <p:nvPr/>
+          </p:nvSpPr>
+          <p:spPr>
+            <a:xfrm>
+              <a:off x="970476" y="1274295"/>
+              <a:ext cx="2059619" cy="159798"/>
+            </a:xfrm>
+            <a:prstGeom prst="rect">
+              <a:avLst/>
+            </a:prstGeom>
+          </p:spPr>
+          <p:style>
+            <a:lnRef idx="2">
+              <a:schemeClr val="dk1">
+                <a:shade val="50000"/>
+              </a:schemeClr>
+            </a:lnRef>
+            <a:fillRef idx="1">
+              <a:schemeClr val="dk1"/>
+            </a:fillRef>
+            <a:effectRef idx="0">
+              <a:schemeClr val="dk1"/>
+            </a:effectRef>
+            <a:fontRef idx="minor">
+              <a:schemeClr val="lt1"/>
+            </a:fontRef>
+          </p:style>
+          <p:txBody>
+            <a:bodyPr rtlCol="0" anchor="ctr"/>
+            <a:lstStyle/>
+            <a:p>
+              <a:pPr algn="ctr"/>
+              <a:endParaRPr lang="en-AU"/>
+            </a:p>
+          </p:txBody>
+        </p:sp>
+        <p:sp>
+          <p:nvSpPr>
+            <p:cNvPr id="5" name="Rectangle 4">
+              <a:extLst>
+                <a:ext uri="{FF2B5EF4-FFF2-40B4-BE49-F238E27FC236}">
+                  <a16:creationId xmlns:a16="http://schemas.microsoft.com/office/drawing/2014/main" id="{35F040B2-FC51-44C8-947A-410AF1C79C98}"/>
+                </a:ext>
+              </a:extLst>
+            </p:cNvPr>
+            <p:cNvSpPr/>
+            <p:nvPr/>
+          </p:nvSpPr>
+          <p:spPr>
+            <a:xfrm>
+              <a:off x="970476" y="1434096"/>
+              <a:ext cx="2059619" cy="1056447"/>
+            </a:xfrm>
+            <a:prstGeom prst="rect">
+              <a:avLst/>
+            </a:prstGeom>
+          </p:spPr>
+          <p:style>
+            <a:lnRef idx="2">
+              <a:schemeClr val="accent3">
+                <a:shade val="50000"/>
+              </a:schemeClr>
+            </a:lnRef>
+            <a:fillRef idx="1">
+              <a:schemeClr val="accent3"/>
+            </a:fillRef>
+            <a:effectRef idx="0">
+              <a:schemeClr val="accent3"/>
+            </a:effectRef>
+            <a:fontRef idx="minor">
+              <a:schemeClr val="lt1"/>
+            </a:fontRef>
+          </p:style>
+          <p:txBody>
+            <a:bodyPr rtlCol="0" anchor="ctr"/>
+            <a:lstStyle/>
+            <a:p>
+              <a:pPr algn="ctr"/>
+              <a:endParaRPr lang="en-AU"/>
+            </a:p>
+          </p:txBody>
+        </p:sp>
+        <p:sp>
+          <p:nvSpPr>
+            <p:cNvPr id="16" name="Freeform: Shape 15">
+              <a:extLst>
+                <a:ext uri="{FF2B5EF4-FFF2-40B4-BE49-F238E27FC236}">
+                  <a16:creationId xmlns:a16="http://schemas.microsoft.com/office/drawing/2014/main" id="{251B3998-E0F0-4577-BC91-5FF6E21A6664}"/>
+                </a:ext>
+              </a:extLst>
+            </p:cNvPr>
+            <p:cNvSpPr/>
+            <p:nvPr/>
+          </p:nvSpPr>
+          <p:spPr>
+            <a:xfrm>
+              <a:off x="1343337" y="1441024"/>
+              <a:ext cx="1313895" cy="2418428"/>
+            </a:xfrm>
+            <a:custGeom>
+              <a:avLst/>
+              <a:gdLst>
+                <a:gd name="connsiteX0" fmla="*/ 506980 w 1313895"/>
+                <a:gd name="connsiteY0" fmla="*/ 0 h 2418428"/>
+                <a:gd name="connsiteX1" fmla="*/ 806916 w 1313895"/>
+                <a:gd name="connsiteY1" fmla="*/ 0 h 2418428"/>
+                <a:gd name="connsiteX2" fmla="*/ 1313895 w 1313895"/>
+                <a:gd name="connsiteY2" fmla="*/ 2418428 h 2418428"/>
+                <a:gd name="connsiteX3" fmla="*/ 0 w 1313895"/>
+                <a:gd name="connsiteY3" fmla="*/ 2418428 h 2418428"/>
+              </a:gdLst>
+              <a:ahLst/>
+              <a:cxnLst>
+                <a:cxn ang="0">
+                  <a:pos x="connsiteX0" y="connsiteY0"/>
+                </a:cxn>
+                <a:cxn ang="0">
+                  <a:pos x="connsiteX1" y="connsiteY1"/>
+                </a:cxn>
+                <a:cxn ang="0">
+                  <a:pos x="connsiteX2" y="connsiteY2"/>
+                </a:cxn>
+                <a:cxn ang="0">
+                  <a:pos x="connsiteX3" y="connsiteY3"/>
+                </a:cxn>
+              </a:cxnLst>
+              <a:rect l="l" t="t" r="r" b="b"/>
+              <a:pathLst>
+                <a:path w="1313895" h="2418428">
+                  <a:moveTo>
+                    <a:pt x="506980" y="0"/>
+                  </a:moveTo>
+                  <a:lnTo>
+                    <a:pt x="806916" y="0"/>
+                  </a:lnTo>
+                  <a:lnTo>
+                    <a:pt x="1313895" y="2418428"/>
+                  </a:lnTo>
+                  <a:lnTo>
+                    <a:pt x="0" y="2418428"/>
+                  </a:lnTo>
+                  <a:close/>
+                </a:path>
+              </a:pathLst>
+            </a:custGeom>
+            <a:solidFill>
+              <a:schemeClr val="bg1"/>
+            </a:solidFill>
+            <a:ln>
+              <a:noFill/>
+            </a:ln>
+          </p:spPr>
+          <p:style>
+            <a:lnRef idx="2">
+              <a:schemeClr val="accent1">
+                <a:shade val="50000"/>
+              </a:schemeClr>
+            </a:lnRef>
+            <a:fillRef idx="1">
+              <a:schemeClr val="accent1"/>
+            </a:fillRef>
+            <a:effectRef idx="0">
+              <a:schemeClr val="accent1"/>
+            </a:effectRef>
+            <a:fontRef idx="minor">
+              <a:schemeClr val="lt1"/>
+            </a:fontRef>
+          </p:style>
+          <p:txBody>
+            <a:bodyPr wrap="square" rtlCol="0" anchor="ctr">
+              <a:noAutofit/>
+            </a:bodyPr>
+            <a:lstStyle/>
+            <a:p>
+              <a:pPr algn="ctr"/>
+              <a:endParaRPr lang="en-AU"/>
+            </a:p>
+          </p:txBody>
+        </p:sp>
+        <p:sp>
+          <p:nvSpPr>
+            <p:cNvPr id="7" name="Rectangle 6">
+              <a:extLst>
+                <a:ext uri="{FF2B5EF4-FFF2-40B4-BE49-F238E27FC236}">
+                  <a16:creationId xmlns:a16="http://schemas.microsoft.com/office/drawing/2014/main" id="{AAF1236B-36FC-4F4D-8925-5CEA13FFDD8C}"/>
+                </a:ext>
+              </a:extLst>
+            </p:cNvPr>
+            <p:cNvSpPr/>
+            <p:nvPr/>
+          </p:nvSpPr>
+          <p:spPr>
+            <a:xfrm>
+              <a:off x="970474" y="3082005"/>
+              <a:ext cx="2059619" cy="852261"/>
+            </a:xfrm>
+            <a:prstGeom prst="rect">
+              <a:avLst/>
+            </a:prstGeom>
+          </p:spPr>
+          <p:style>
+            <a:lnRef idx="2">
+              <a:schemeClr val="accent3">
+                <a:shade val="50000"/>
+              </a:schemeClr>
+            </a:lnRef>
+            <a:fillRef idx="1">
+              <a:schemeClr val="accent3"/>
+            </a:fillRef>
+            <a:effectRef idx="0">
+              <a:schemeClr val="accent3"/>
+            </a:effectRef>
+            <a:fontRef idx="minor">
+              <a:schemeClr val="lt1"/>
+            </a:fontRef>
+          </p:style>
+          <p:txBody>
+            <a:bodyPr rtlCol="0" anchor="ctr"/>
+            <a:lstStyle/>
+            <a:p>
+              <a:pPr algn="ctr"/>
+              <a:endParaRPr lang="en-AU"/>
+            </a:p>
+          </p:txBody>
+        </p:sp>
+        <p:sp>
+          <p:nvSpPr>
+            <p:cNvPr id="8" name="Isosceles Triangle 7">
+              <a:extLst>
+                <a:ext uri="{FF2B5EF4-FFF2-40B4-BE49-F238E27FC236}">
+                  <a16:creationId xmlns:a16="http://schemas.microsoft.com/office/drawing/2014/main" id="{E233E710-B83A-4ACE-8317-9A31CC51EAD6}"/>
+                </a:ext>
+              </a:extLst>
+            </p:cNvPr>
+            <p:cNvSpPr/>
+            <p:nvPr/>
+          </p:nvSpPr>
+          <p:spPr>
+            <a:xfrm>
+              <a:off x="1578592" y="1917147"/>
+              <a:ext cx="843378" cy="3733061"/>
+            </a:xfrm>
+            <a:prstGeom prst="triangle">
+              <a:avLst/>
+            </a:prstGeom>
+            <a:solidFill>
+              <a:schemeClr val="bg1"/>
+            </a:solidFill>
+            <a:ln>
+              <a:noFill/>
+            </a:ln>
+          </p:spPr>
+          <p:style>
+            <a:lnRef idx="2">
+              <a:schemeClr val="accent1">
+                <a:shade val="50000"/>
+              </a:schemeClr>
+            </a:lnRef>
+            <a:fillRef idx="1">
+              <a:schemeClr val="accent1"/>
+            </a:fillRef>
+            <a:effectRef idx="0">
+              <a:schemeClr val="accent1"/>
+            </a:effectRef>
+            <a:fontRef idx="minor">
+              <a:schemeClr val="lt1"/>
+            </a:fontRef>
+          </p:style>
+          <p:txBody>
+            <a:bodyPr rtlCol="0" anchor="ctr"/>
+            <a:lstStyle/>
+            <a:p>
+              <a:pPr algn="ctr"/>
+              <a:endParaRPr lang="en-AU"/>
+            </a:p>
+          </p:txBody>
+        </p:sp>
+        <p:sp>
+          <p:nvSpPr>
+            <p:cNvPr id="9" name="Rectangle 8">
+              <a:extLst>
+                <a:ext uri="{FF2B5EF4-FFF2-40B4-BE49-F238E27FC236}">
+                  <a16:creationId xmlns:a16="http://schemas.microsoft.com/office/drawing/2014/main" id="{C7F2CC98-225A-4DEC-9F79-1F93683BB870}"/>
+                </a:ext>
+              </a:extLst>
+            </p:cNvPr>
+            <p:cNvSpPr/>
+            <p:nvPr/>
+          </p:nvSpPr>
+          <p:spPr>
+            <a:xfrm>
+              <a:off x="917307" y="5271631"/>
+              <a:ext cx="2175030" cy="1686757"/>
+            </a:xfrm>
+            <a:prstGeom prst="rect">
+              <a:avLst/>
+            </a:prstGeom>
+          </p:spPr>
+          <p:style>
+            <a:lnRef idx="2">
+              <a:schemeClr val="accent1">
+                <a:shade val="50000"/>
+              </a:schemeClr>
+            </a:lnRef>
+            <a:fillRef idx="1">
+              <a:schemeClr val="accent1"/>
+            </a:fillRef>
+            <a:effectRef idx="0">
+              <a:schemeClr val="accent1"/>
+            </a:effectRef>
+            <a:fontRef idx="minor">
+              <a:schemeClr val="lt1"/>
+            </a:fontRef>
+          </p:style>
+          <p:txBody>
+            <a:bodyPr rtlCol="0" anchor="ctr"/>
+            <a:lstStyle/>
+            <a:p>
+              <a:pPr algn="ctr"/>
+              <a:endParaRPr lang="en-AU" dirty="0"/>
+            </a:p>
+          </p:txBody>
+        </p:sp>
+        <p:cxnSp>
+          <p:nvCxnSpPr>
+            <p:cNvPr id="11" name="Straight Connector 10">
+              <a:extLst>
+                <a:ext uri="{FF2B5EF4-FFF2-40B4-BE49-F238E27FC236}">
+                  <a16:creationId xmlns:a16="http://schemas.microsoft.com/office/drawing/2014/main" id="{92A9CE75-2108-4AA0-A12B-F617E73021D4}"/>
+                </a:ext>
+              </a:extLst>
+            </p:cNvPr>
+            <p:cNvCxnSpPr>
+              <a:cxnSpLocks/>
+              <a:endCxn id="9" idx="2"/>
+            </p:cNvCxnSpPr>
+            <p:nvPr/>
+          </p:nvCxnSpPr>
+          <p:spPr>
+            <a:xfrm>
+              <a:off x="2000287" y="715002"/>
+              <a:ext cx="4537" cy="6243384"/>
+            </a:xfrm>
+            <a:prstGeom prst="line">
+              <a:avLst/>
+            </a:prstGeom>
+            <a:ln>
+              <a:solidFill>
+                <a:schemeClr val="tx1"/>
+              </a:solidFill>
+              <a:prstDash val="dash"/>
+            </a:ln>
+          </p:spPr>
+          <p:style>
+            <a:lnRef idx="1">
+              <a:schemeClr val="accent1"/>
+            </a:lnRef>
+            <a:fillRef idx="0">
+              <a:schemeClr val="accent1"/>
+            </a:fillRef>
+            <a:effectRef idx="0">
+              <a:schemeClr val="accent1"/>
+            </a:effectRef>
+            <a:fontRef idx="minor">
+              <a:schemeClr val="tx1"/>
+            </a:fontRef>
+          </p:style>
+        </p:cxnSp>
+        <p:cxnSp>
+          <p:nvCxnSpPr>
+            <p:cNvPr id="17" name="Straight Connector 16">
+              <a:extLst>
+                <a:ext uri="{FF2B5EF4-FFF2-40B4-BE49-F238E27FC236}">
+                  <a16:creationId xmlns:a16="http://schemas.microsoft.com/office/drawing/2014/main" id="{3328A092-32FE-4DC8-A04C-AC78F456A89C}"/>
+                </a:ext>
+              </a:extLst>
+            </p:cNvPr>
+            <p:cNvCxnSpPr>
+              <a:cxnSpLocks/>
+              <a:stCxn id="9" idx="3"/>
+              <a:endCxn id="9" idx="1"/>
+            </p:cNvCxnSpPr>
+            <p:nvPr/>
+          </p:nvCxnSpPr>
+          <p:spPr>
+            <a:xfrm flipH="1">
+              <a:off x="917307" y="6115008"/>
+              <a:ext cx="2175030" cy="0"/>
+            </a:xfrm>
+            <a:prstGeom prst="line">
+              <a:avLst/>
+            </a:prstGeom>
+            <a:ln>
+              <a:solidFill>
+                <a:schemeClr val="tx1"/>
+              </a:solidFill>
+              <a:prstDash val="dash"/>
+            </a:ln>
+          </p:spPr>
+          <p:style>
+            <a:lnRef idx="1">
+              <a:schemeClr val="accent1"/>
+            </a:lnRef>
+            <a:fillRef idx="0">
+              <a:schemeClr val="accent1"/>
+            </a:fillRef>
+            <a:effectRef idx="0">
+              <a:schemeClr val="accent1"/>
+            </a:effectRef>
+            <a:fontRef idx="minor">
+              <a:schemeClr val="tx1"/>
+            </a:fontRef>
+          </p:style>
+        </p:cxnSp>
+        <p:sp>
+          <p:nvSpPr>
+            <p:cNvPr id="23" name="TextBox 22">
+              <a:extLst>
+                <a:ext uri="{FF2B5EF4-FFF2-40B4-BE49-F238E27FC236}">
+                  <a16:creationId xmlns:a16="http://schemas.microsoft.com/office/drawing/2014/main" id="{437EBE64-C708-4FA2-81CC-C52A7878FE8A}"/>
+                </a:ext>
+              </a:extLst>
+            </p:cNvPr>
+            <p:cNvSpPr txBox="1"/>
+            <p:nvPr/>
+          </p:nvSpPr>
+          <p:spPr>
+            <a:xfrm>
+              <a:off x="1586182" y="719572"/>
+              <a:ext cx="454412" cy="369332"/>
+            </a:xfrm>
+            <a:prstGeom prst="rect">
+              <a:avLst/>
+            </a:prstGeom>
+            <a:noFill/>
+          </p:spPr>
+          <p:txBody>
+            <a:bodyPr wrap="square" rtlCol="0">
+              <a:spAutoFit/>
+            </a:bodyPr>
+            <a:lstStyle/>
+            <a:p>
+              <a:r>
+                <a:rPr lang="en-US" dirty="0">
+                  <a:solidFill>
+                    <a:schemeClr val="accent1">
+                      <a:lumMod val="75000"/>
+                    </a:schemeClr>
+                  </a:solidFill>
+                </a:rPr>
+                <a:t>e-</a:t>
+              </a:r>
+              <a:endParaRPr lang="en-AU" dirty="0">
+                <a:solidFill>
+                  <a:schemeClr val="accent1">
+                    <a:lumMod val="75000"/>
+                  </a:schemeClr>
+                </a:solidFill>
+              </a:endParaRPr>
+            </a:p>
+          </p:txBody>
+        </p:sp>
+        <p:cxnSp>
+          <p:nvCxnSpPr>
+            <p:cNvPr id="25" name="Straight Arrow Connector 24">
+              <a:extLst>
+                <a:ext uri="{FF2B5EF4-FFF2-40B4-BE49-F238E27FC236}">
+                  <a16:creationId xmlns:a16="http://schemas.microsoft.com/office/drawing/2014/main" id="{F8AD6AA9-8E04-4F03-8C00-DB35429577A7}"/>
+                </a:ext>
+              </a:extLst>
+            </p:cNvPr>
+            <p:cNvCxnSpPr>
+              <a:cxnSpLocks/>
+            </p:cNvCxnSpPr>
+            <p:nvPr/>
+          </p:nvCxnSpPr>
+          <p:spPr>
+            <a:xfrm>
+              <a:off x="1918993" y="736268"/>
+              <a:ext cx="0" cy="461434"/>
+            </a:xfrm>
+            <a:prstGeom prst="straightConnector1">
+              <a:avLst/>
+            </a:prstGeom>
+            <a:ln>
+              <a:solidFill>
+                <a:srgbClr val="2F5597"/>
+              </a:solidFill>
+              <a:tailEnd type="triangle"/>
+            </a:ln>
+          </p:spPr>
+          <p:style>
+            <a:lnRef idx="1">
+              <a:schemeClr val="dk1"/>
+            </a:lnRef>
+            <a:fillRef idx="0">
+              <a:schemeClr val="dk1"/>
+            </a:fillRef>
+            <a:effectRef idx="0">
+              <a:schemeClr val="dk1"/>
+            </a:effectRef>
+            <a:fontRef idx="minor">
+              <a:schemeClr val="tx1"/>
+            </a:fontRef>
+          </p:style>
+        </p:cxnSp>
+        <p:sp>
+          <p:nvSpPr>
+            <p:cNvPr id="29" name="TextBox 28">
+              <a:extLst>
+                <a:ext uri="{FF2B5EF4-FFF2-40B4-BE49-F238E27FC236}">
+                  <a16:creationId xmlns:a16="http://schemas.microsoft.com/office/drawing/2014/main" id="{F7ED876C-4FC9-453A-B701-CCBC69CB25F1}"/>
+                </a:ext>
+              </a:extLst>
+            </p:cNvPr>
+            <p:cNvSpPr txBox="1"/>
+            <p:nvPr/>
+          </p:nvSpPr>
+          <p:spPr>
+            <a:xfrm>
+              <a:off x="3030092" y="1169528"/>
+              <a:ext cx="1903021" cy="369332"/>
+            </a:xfrm>
+            <a:prstGeom prst="rect">
+              <a:avLst/>
+            </a:prstGeom>
+            <a:noFill/>
+          </p:spPr>
+          <p:txBody>
+            <a:bodyPr wrap="square" rtlCol="0">
+              <a:spAutoFit/>
+            </a:bodyPr>
+            <a:lstStyle/>
+            <a:p>
+              <a:r>
+                <a:rPr lang="en-US" dirty="0"/>
+                <a:t>X-ray target</a:t>
+              </a:r>
+              <a:endParaRPr lang="en-AU" dirty="0"/>
+            </a:p>
+          </p:txBody>
+        </p:sp>
+        <p:sp>
+          <p:nvSpPr>
+            <p:cNvPr id="30" name="TextBox 29">
+              <a:extLst>
+                <a:ext uri="{FF2B5EF4-FFF2-40B4-BE49-F238E27FC236}">
+                  <a16:creationId xmlns:a16="http://schemas.microsoft.com/office/drawing/2014/main" id="{FDF7100D-CEC2-4DC7-B579-F84146FDA36A}"/>
+                </a:ext>
+              </a:extLst>
+            </p:cNvPr>
+            <p:cNvSpPr txBox="1"/>
+            <p:nvPr/>
+          </p:nvSpPr>
+          <p:spPr>
+            <a:xfrm>
+              <a:off x="3087801" y="1777650"/>
+              <a:ext cx="1903021" cy="369332"/>
+            </a:xfrm>
+            <a:prstGeom prst="rect">
+              <a:avLst/>
+            </a:prstGeom>
+            <a:noFill/>
+          </p:spPr>
+          <p:txBody>
+            <a:bodyPr wrap="square" rtlCol="0">
+              <a:spAutoFit/>
+            </a:bodyPr>
+            <a:lstStyle/>
+            <a:p>
+              <a:r>
+                <a:rPr lang="en-US" dirty="0"/>
+                <a:t>Primary collimator</a:t>
+              </a:r>
+              <a:endParaRPr lang="en-AU" dirty="0"/>
+            </a:p>
+          </p:txBody>
+        </p:sp>
+        <p:sp>
+          <p:nvSpPr>
+            <p:cNvPr id="31" name="TextBox 30">
+              <a:extLst>
+                <a:ext uri="{FF2B5EF4-FFF2-40B4-BE49-F238E27FC236}">
+                  <a16:creationId xmlns:a16="http://schemas.microsoft.com/office/drawing/2014/main" id="{66E956B1-F5E5-497B-9961-90984BBE4052}"/>
+                </a:ext>
+              </a:extLst>
+            </p:cNvPr>
+            <p:cNvSpPr txBox="1"/>
+            <p:nvPr/>
+          </p:nvSpPr>
+          <p:spPr>
+            <a:xfrm>
+              <a:off x="3087801" y="3223611"/>
+              <a:ext cx="1903021" cy="646331"/>
+            </a:xfrm>
+            <a:prstGeom prst="rect">
+              <a:avLst/>
+            </a:prstGeom>
+            <a:noFill/>
+          </p:spPr>
+          <p:txBody>
+            <a:bodyPr wrap="square" rtlCol="0">
+              <a:spAutoFit/>
+            </a:bodyPr>
+            <a:lstStyle/>
+            <a:p>
+              <a:r>
+                <a:rPr lang="en-US" dirty="0"/>
+                <a:t>Secondary collimator</a:t>
+              </a:r>
+              <a:endParaRPr lang="en-AU" dirty="0"/>
+            </a:p>
+          </p:txBody>
+        </p:sp>
+        <p:cxnSp>
+          <p:nvCxnSpPr>
+            <p:cNvPr id="33" name="Straight Arrow Connector 32">
+              <a:extLst>
+                <a:ext uri="{FF2B5EF4-FFF2-40B4-BE49-F238E27FC236}">
+                  <a16:creationId xmlns:a16="http://schemas.microsoft.com/office/drawing/2014/main" id="{ADEE0319-D4E0-4981-A9B7-F48094D820C2}"/>
+                </a:ext>
+              </a:extLst>
+            </p:cNvPr>
+            <p:cNvCxnSpPr>
+              <a:cxnSpLocks/>
+            </p:cNvCxnSpPr>
+            <p:nvPr/>
+          </p:nvCxnSpPr>
+          <p:spPr>
+            <a:xfrm>
+              <a:off x="1873743" y="3082002"/>
+              <a:ext cx="266700" cy="0"/>
+            </a:xfrm>
+            <a:prstGeom prst="straightConnector1">
+              <a:avLst/>
+            </a:prstGeom>
+            <a:ln>
+              <a:solidFill>
+                <a:srgbClr val="FF0000"/>
+              </a:solidFill>
+              <a:headEnd type="triangle"/>
+              <a:tailEnd type="triangle"/>
+            </a:ln>
+          </p:spPr>
+          <p:style>
+            <a:lnRef idx="1">
+              <a:schemeClr val="accent1"/>
+            </a:lnRef>
+            <a:fillRef idx="0">
+              <a:schemeClr val="accent1"/>
+            </a:fillRef>
+            <a:effectRef idx="0">
+              <a:schemeClr val="accent1"/>
+            </a:effectRef>
+            <a:fontRef idx="minor">
+              <a:schemeClr val="tx1"/>
+            </a:fontRef>
+          </p:style>
+        </p:cxnSp>
+        <p:cxnSp>
+          <p:nvCxnSpPr>
+            <p:cNvPr id="36" name="Straight Arrow Connector 35">
+              <a:extLst>
+                <a:ext uri="{FF2B5EF4-FFF2-40B4-BE49-F238E27FC236}">
+                  <a16:creationId xmlns:a16="http://schemas.microsoft.com/office/drawing/2014/main" id="{E1D3B601-7434-4921-BDC4-6FDDBF6DBD86}"/>
+                </a:ext>
+              </a:extLst>
+            </p:cNvPr>
+            <p:cNvCxnSpPr>
+              <a:cxnSpLocks/>
+            </p:cNvCxnSpPr>
+            <p:nvPr/>
+          </p:nvCxnSpPr>
+          <p:spPr>
+            <a:xfrm>
+              <a:off x="1788017" y="3934263"/>
+              <a:ext cx="442917" cy="0"/>
+            </a:xfrm>
+            <a:prstGeom prst="straightConnector1">
+              <a:avLst/>
+            </a:prstGeom>
+            <a:ln>
+              <a:solidFill>
+                <a:srgbClr val="FF0000"/>
+              </a:solidFill>
+              <a:headEnd type="triangle"/>
+              <a:tailEnd type="triangle"/>
+            </a:ln>
+          </p:spPr>
+          <p:style>
+            <a:lnRef idx="1">
+              <a:schemeClr val="accent1"/>
+            </a:lnRef>
+            <a:fillRef idx="0">
+              <a:schemeClr val="accent1"/>
+            </a:fillRef>
+            <a:effectRef idx="0">
+              <a:schemeClr val="accent1"/>
+            </a:effectRef>
+            <a:fontRef idx="minor">
+              <a:schemeClr val="tx1"/>
+            </a:fontRef>
+          </p:style>
+        </p:cxnSp>
+        <p:cxnSp>
+          <p:nvCxnSpPr>
+            <p:cNvPr id="38" name="Straight Arrow Connector 37">
+              <a:extLst>
+                <a:ext uri="{FF2B5EF4-FFF2-40B4-BE49-F238E27FC236}">
+                  <a16:creationId xmlns:a16="http://schemas.microsoft.com/office/drawing/2014/main" id="{9472E6A1-90FE-4025-81FA-3132E6B07D17}"/>
+                </a:ext>
+              </a:extLst>
+            </p:cNvPr>
+            <p:cNvCxnSpPr>
+              <a:cxnSpLocks/>
+            </p:cNvCxnSpPr>
+            <p:nvPr/>
+          </p:nvCxnSpPr>
+          <p:spPr>
+            <a:xfrm>
+              <a:off x="917306" y="3064734"/>
+              <a:ext cx="0" cy="874295"/>
+            </a:xfrm>
+            <a:prstGeom prst="straightConnector1">
+              <a:avLst/>
+            </a:prstGeom>
+            <a:ln>
+              <a:solidFill>
+                <a:srgbClr val="FF0000"/>
+              </a:solidFill>
+              <a:headEnd type="triangle"/>
+              <a:tailEnd type="triangle"/>
+            </a:ln>
+          </p:spPr>
+          <p:style>
+            <a:lnRef idx="1">
+              <a:schemeClr val="accent1"/>
+            </a:lnRef>
+            <a:fillRef idx="0">
+              <a:schemeClr val="accent1"/>
+            </a:fillRef>
+            <a:effectRef idx="0">
+              <a:schemeClr val="accent1"/>
+            </a:effectRef>
+            <a:fontRef idx="minor">
+              <a:schemeClr val="tx1"/>
+            </a:fontRef>
+          </p:style>
+        </p:cxnSp>
+        <p:sp>
+          <p:nvSpPr>
+            <p:cNvPr id="42" name="TextBox 41">
+              <a:extLst>
+                <a:ext uri="{FF2B5EF4-FFF2-40B4-BE49-F238E27FC236}">
+                  <a16:creationId xmlns:a16="http://schemas.microsoft.com/office/drawing/2014/main" id="{AFAF30EA-DEA6-4FC4-A5E2-F063E345EB21}"/>
+                </a:ext>
+              </a:extLst>
+            </p:cNvPr>
+            <p:cNvSpPr txBox="1"/>
+            <p:nvPr/>
+          </p:nvSpPr>
+          <p:spPr>
+            <a:xfrm>
+              <a:off x="3087801" y="5689147"/>
+              <a:ext cx="1903021" cy="369332"/>
+            </a:xfrm>
+            <a:prstGeom prst="rect">
+              <a:avLst/>
+            </a:prstGeom>
+            <a:noFill/>
+          </p:spPr>
+          <p:txBody>
+            <a:bodyPr wrap="square" rtlCol="0">
+              <a:spAutoFit/>
+            </a:bodyPr>
+            <a:lstStyle/>
+            <a:p>
+              <a:r>
+                <a:rPr lang="en-US" dirty="0"/>
+                <a:t>Water tank</a:t>
+              </a:r>
+              <a:endParaRPr lang="en-AU" dirty="0"/>
+            </a:p>
+          </p:txBody>
+        </p:sp>
+        <p:sp>
+          <p:nvSpPr>
+            <p:cNvPr id="44" name="TextBox 43">
+              <a:extLst>
+                <a:ext uri="{FF2B5EF4-FFF2-40B4-BE49-F238E27FC236}">
+                  <a16:creationId xmlns:a16="http://schemas.microsoft.com/office/drawing/2014/main" id="{D4A46727-5ADE-4BCA-8D74-54377AE61EC0}"/>
+                </a:ext>
+              </a:extLst>
+            </p:cNvPr>
+            <p:cNvSpPr txBox="1"/>
+            <p:nvPr/>
+          </p:nvSpPr>
+          <p:spPr>
+            <a:xfrm>
+              <a:off x="1975097" y="2747095"/>
+              <a:ext cx="2777345" cy="369332"/>
+            </a:xfrm>
+            <a:prstGeom prst="rect">
+              <a:avLst/>
+            </a:prstGeom>
+            <a:noFill/>
+          </p:spPr>
+          <p:txBody>
+            <a:bodyPr wrap="square" rtlCol="0">
+              <a:spAutoFit/>
+            </a:bodyPr>
+            <a:lstStyle/>
+            <a:p>
+              <a:r>
+                <a:rPr lang="en-US" b="1" i="1" dirty="0">
+                  <a:solidFill>
+                    <a:srgbClr val="FF0000"/>
+                  </a:solidFill>
+                </a:rPr>
+                <a:t>Up-stream aperture radius</a:t>
+              </a:r>
+              <a:endParaRPr lang="en-AU" b="1" i="1" dirty="0">
+                <a:solidFill>
+                  <a:srgbClr val="FF0000"/>
+                </a:solidFill>
+              </a:endParaRPr>
+            </a:p>
+          </p:txBody>
+        </p:sp>
+        <p:sp>
+          <p:nvSpPr>
+            <p:cNvPr id="45" name="TextBox 44">
+              <a:extLst>
+                <a:ext uri="{FF2B5EF4-FFF2-40B4-BE49-F238E27FC236}">
+                  <a16:creationId xmlns:a16="http://schemas.microsoft.com/office/drawing/2014/main" id="{1773D269-C424-41BF-93A7-94DF91CA901E}"/>
+                </a:ext>
+              </a:extLst>
+            </p:cNvPr>
+            <p:cNvSpPr txBox="1"/>
+            <p:nvPr/>
+          </p:nvSpPr>
+          <p:spPr>
+            <a:xfrm>
+              <a:off x="1945481" y="3927458"/>
+              <a:ext cx="2777345" cy="646331"/>
+            </a:xfrm>
+            <a:prstGeom prst="rect">
+              <a:avLst/>
+            </a:prstGeom>
+            <a:noFill/>
+          </p:spPr>
+          <p:txBody>
+            <a:bodyPr wrap="square" rtlCol="0">
+              <a:spAutoFit/>
+            </a:bodyPr>
+            <a:lstStyle/>
+            <a:p>
+              <a:r>
+                <a:rPr lang="en-US" b="1" i="1" dirty="0">
+                  <a:solidFill>
+                    <a:srgbClr val="FF0000"/>
+                  </a:solidFill>
+                </a:rPr>
+                <a:t>Down-stream aperture radius</a:t>
+              </a:r>
+              <a:endParaRPr lang="en-AU" b="1" i="1" dirty="0">
+                <a:solidFill>
+                  <a:srgbClr val="FF0000"/>
+                </a:solidFill>
+              </a:endParaRPr>
+            </a:p>
+          </p:txBody>
+        </p:sp>
+        <p:sp>
+          <p:nvSpPr>
+            <p:cNvPr id="46" name="TextBox 45">
+              <a:extLst>
+                <a:ext uri="{FF2B5EF4-FFF2-40B4-BE49-F238E27FC236}">
+                  <a16:creationId xmlns:a16="http://schemas.microsoft.com/office/drawing/2014/main" id="{B719E1B4-7850-44BD-9BC1-E84D787DA2F8}"/>
+                </a:ext>
+              </a:extLst>
+            </p:cNvPr>
+            <p:cNvSpPr txBox="1"/>
+            <p:nvPr/>
+          </p:nvSpPr>
+          <p:spPr>
+            <a:xfrm>
+              <a:off x="-73912" y="2786170"/>
+              <a:ext cx="1206779" cy="646331"/>
+            </a:xfrm>
+            <a:prstGeom prst="rect">
+              <a:avLst/>
+            </a:prstGeom>
+            <a:noFill/>
+          </p:spPr>
+          <p:txBody>
+            <a:bodyPr wrap="square" rtlCol="0">
+              <a:spAutoFit/>
+            </a:bodyPr>
+            <a:lstStyle/>
+            <a:p>
+              <a:r>
+                <a:rPr lang="en-US" b="1" i="1" dirty="0">
+                  <a:solidFill>
+                    <a:srgbClr val="FF0000"/>
+                  </a:solidFill>
+                </a:rPr>
+                <a:t>Collimator Thickness</a:t>
+              </a:r>
+              <a:endParaRPr lang="en-AU" b="1" i="1" dirty="0">
+                <a:solidFill>
+                  <a:srgbClr val="FF0000"/>
+                </a:solidFill>
+              </a:endParaRPr>
+            </a:p>
+          </p:txBody>
+        </p:sp>
+        <p:sp>
+          <p:nvSpPr>
+            <p:cNvPr id="24" name="TextBox 23">
+              <a:extLst>
+                <a:ext uri="{FF2B5EF4-FFF2-40B4-BE49-F238E27FC236}">
+                  <a16:creationId xmlns:a16="http://schemas.microsoft.com/office/drawing/2014/main" id="{E9D31A13-E480-47CD-90DB-4505E99A4ABA}"/>
+                </a:ext>
+              </a:extLst>
+            </p:cNvPr>
+            <p:cNvSpPr txBox="1"/>
+            <p:nvPr/>
+          </p:nvSpPr>
+          <p:spPr>
+            <a:xfrm>
+              <a:off x="741692" y="92599"/>
+              <a:ext cx="3831077" cy="923330"/>
+            </a:xfrm>
+            <a:prstGeom prst="rect">
+              <a:avLst/>
+            </a:prstGeom>
+            <a:noFill/>
+          </p:spPr>
+          <p:txBody>
+            <a:bodyPr wrap="square">
+              <a:spAutoFit/>
+            </a:bodyPr>
+            <a:lstStyle/>
+            <a:p>
+              <a:r>
+                <a:rPr lang="en-AU" dirty="0">
+                  <a:solidFill>
+                    <a:schemeClr val="accent1">
+                      <a:lumMod val="75000"/>
+                    </a:schemeClr>
+                  </a:solidFill>
+                </a:rPr>
+                <a:t>{</a:t>
+              </a:r>
+              <a:r>
+                <a:rPr lang="en-AU" b="1" dirty="0">
+                  <a:solidFill>
+                    <a:schemeClr val="accent1">
+                      <a:lumMod val="75000"/>
+                    </a:schemeClr>
+                  </a:solidFill>
+                </a:rPr>
+                <a:t>Energy, Position </a:t>
+              </a:r>
+              <a:r>
+                <a:rPr lang="en-AU" b="1" dirty="0" err="1">
+                  <a:solidFill>
+                    <a:schemeClr val="accent1">
+                      <a:lumMod val="75000"/>
+                    </a:schemeClr>
+                  </a:solidFill>
+                </a:rPr>
+                <a:t>Cutoff</a:t>
+              </a:r>
+              <a:r>
+                <a:rPr lang="en-AU" b="1" dirty="0">
+                  <a:solidFill>
+                    <a:schemeClr val="accent1">
+                      <a:lumMod val="75000"/>
+                    </a:schemeClr>
+                  </a:solidFill>
+                </a:rPr>
+                <a:t>, Position Spread, Angular Spread, Angular </a:t>
+              </a:r>
+              <a:r>
+                <a:rPr lang="en-AU" b="1" dirty="0" err="1">
+                  <a:solidFill>
+                    <a:schemeClr val="accent1">
+                      <a:lumMod val="75000"/>
+                    </a:schemeClr>
+                  </a:solidFill>
+                </a:rPr>
+                <a:t>Cutoff</a:t>
+              </a:r>
+              <a:r>
+                <a:rPr lang="en-AU" dirty="0">
+                  <a:solidFill>
+                    <a:schemeClr val="accent1">
+                      <a:lumMod val="75000"/>
+                    </a:schemeClr>
+                  </a:solidFill>
+                </a:rPr>
+                <a:t>}</a:t>
+              </a:r>
+            </a:p>
+          </p:txBody>
+        </p:sp>
+      </p:grpSp>
+      <p:pic>
+        <p:nvPicPr>
+          <p:cNvPr id="39" name="Picture 38" descr="Chart, line chart, histogram&#10;&#10;Description automatically generated">
+            <a:extLst>
+              <a:ext uri="{FF2B5EF4-FFF2-40B4-BE49-F238E27FC236}">
+                <a16:creationId xmlns:a16="http://schemas.microsoft.com/office/drawing/2014/main" id="{42B209E6-DC6F-4213-9BDC-8250B5EE0503}"/>
+              </a:ext>
+            </a:extLst>
+          </p:cNvPr>
+          <p:cNvPicPr>
+            <a:picLocks noChangeAspect="1"/>
+          </p:cNvPicPr>
+          <p:nvPr/>
+        </p:nvPicPr>
+        <p:blipFill rotWithShape="1">
+          <a:blip r:embed="rId2">
+            <a:extLst>
+              <a:ext uri="{28A0092B-C50C-407E-A947-70E740481C1C}">
+                <a14:useLocalDpi xmlns:a14="http://schemas.microsoft.com/office/drawing/2010/main" val="0"/>
+              </a:ext>
+            </a:extLst>
+          </a:blip>
+          <a:srcRect l="3782" t="4816" r="9666"/>
+          <a:stretch/>
+        </p:blipFill>
+        <p:spPr bwMode="auto">
+          <a:xfrm>
+            <a:off x="5242473" y="0"/>
+            <a:ext cx="7301686" cy="4014345"/>
+          </a:xfrm>
+          <a:prstGeom prst="rect">
+            <a:avLst/>
+          </a:prstGeom>
+          <a:ln>
+            <a:noFill/>
+          </a:ln>
+          <a:extLst>
+            <a:ext uri="{53640926-AAD7-44D8-BBD7-CCE9431645EC}">
+              <a14:shadowObscured xmlns:a14="http://schemas.microsoft.com/office/drawing/2010/main"/>
+            </a:ext>
+          </a:extLst>
+        </p:spPr>
+      </p:pic>
+      <p:pic>
+        <p:nvPicPr>
+          <p:cNvPr id="27" name="Picture 26" descr="Chart, line chart&#10;&#10;Description automatically generated">
+            <a:extLst>
+              <a:ext uri="{FF2B5EF4-FFF2-40B4-BE49-F238E27FC236}">
+                <a16:creationId xmlns:a16="http://schemas.microsoft.com/office/drawing/2014/main" id="{B963B8A4-612C-41C2-9EEC-FB9483140488}"/>
+              </a:ext>
+            </a:extLst>
+          </p:cNvPr>
+          <p:cNvPicPr>
+            <a:picLocks noChangeAspect="1"/>
+          </p:cNvPicPr>
+          <p:nvPr/>
+        </p:nvPicPr>
+        <p:blipFill rotWithShape="1">
+          <a:blip r:embed="rId3">
+            <a:extLst>
+              <a:ext uri="{28A0092B-C50C-407E-A947-70E740481C1C}">
+                <a14:useLocalDpi xmlns:a14="http://schemas.microsoft.com/office/drawing/2010/main" val="0"/>
+              </a:ext>
+            </a:extLst>
+          </a:blip>
+          <a:srcRect l="5562" t="5796" r="8427"/>
+          <a:stretch/>
+        </p:blipFill>
+        <p:spPr>
+          <a:xfrm>
+            <a:off x="5421391" y="4170825"/>
+            <a:ext cx="7330505" cy="4014345"/>
+          </a:xfrm>
+          <a:prstGeom prst="rect">
+            <a:avLst/>
+          </a:prstGeom>
+        </p:spPr>
+      </p:pic>
+    </p:spTree>
+    <p:extLst>
+      <p:ext uri="{BB962C8B-B14F-4D97-AF65-F5344CB8AC3E}">
+        <p14:creationId xmlns:p14="http://schemas.microsoft.com/office/powerpoint/2010/main" val="2408102945"/>
+      </p:ext>
+    </p:extLst>
+  </p:cSld>
+  <p:clrMapOvr>
+    <a:masterClrMapping/>
+  </p:clrMapOvr>
+</p:sld>
+</file>
+
+<file path=ppt/slides/slide3.xml><?xml version="1.0" encoding="utf-8"?>
+<p:sld xmlns:a="http://schemas.openxmlformats.org/drawingml/2006/main" xmlns:r="http://schemas.openxmlformats.org/officeDocument/2006/relationships" xmlns:p="http://schemas.openxmlformats.org/presentationml/2006/main">
+  <p:cSld>
+    <p:spTree>
+      <p:nvGrpSpPr>
+        <p:cNvPr id="1" name=""/>
+        <p:cNvGrpSpPr/>
+        <p:nvPr/>
+      </p:nvGrpSpPr>
+      <p:grpSpPr>
+        <a:xfrm>
+          <a:off x="0" y="0"/>
+          <a:ext cx="0" cy="0"/>
+          <a:chOff x="0" y="0"/>
+          <a:chExt cx="0" cy="0"/>
+        </a:xfrm>
+      </p:grpSpPr>
       <p:graphicFrame>
         <p:nvGraphicFramePr>
           <p:cNvPr id="4" name="Diagram 3">
@@ -10828,7 +11600,7 @@
           </p:nvPr>
         </p:nvGraphicFramePr>
         <p:xfrm>
-          <a:off x="1339541" y="461639"/>
+          <a:off x="2443647" y="2432522"/>
           <a:ext cx="8128000" cy="5418667"/>
         </p:xfrm>
         <a:graphic>
@@ -10851,7 +11623,7 @@
         </p:nvSpPr>
         <p:spPr>
           <a:xfrm>
-            <a:off x="6880194" y="568170"/>
+            <a:off x="7984303" y="2539051"/>
             <a:ext cx="3568823" cy="1477328"/>
           </a:xfrm>
           <a:prstGeom prst="rect">
@@ -10865,7 +11637,7 @@
           </a:bodyPr>
           <a:lstStyle/>
           <a:p>
-            <a:pPr marL="285750" indent="-285750">
+            <a:pPr marL="285760" indent="-285760">
               <a:buFontTx/>
               <a:buChar char="-"/>
             </a:pPr>
@@ -10875,7 +11647,7 @@
             </a:r>
           </a:p>
           <a:p>
-            <a:pPr marL="285750" indent="-285750">
+            <a:pPr marL="285760" indent="-285760">
               <a:buFontTx/>
               <a:buChar char="-"/>
             </a:pPr>
@@ -10885,7 +11657,7 @@
             </a:r>
           </a:p>
           <a:p>
-            <a:pPr marL="285750" indent="-285750">
+            <a:pPr marL="285760" indent="-285760">
               <a:buFontTx/>
               <a:buChar char="-"/>
             </a:pPr>
@@ -10895,7 +11667,7 @@
             </a:r>
           </a:p>
           <a:p>
-            <a:pPr marL="285750" indent="-285750">
+            <a:pPr marL="285760" indent="-285760">
               <a:buFontTx/>
               <a:buChar char="-"/>
             </a:pPr>
@@ -10909,7 +11681,7 @@
             </a:r>
           </a:p>
           <a:p>
-            <a:pPr marL="285750" indent="-285750">
+            <a:pPr marL="285760" indent="-285760">
               <a:buFontTx/>
               <a:buChar char="-"/>
             </a:pPr>
@@ -10930,7 +11702,7 @@
 </p:sld>
 </file>
 
-<file path=ppt/slides/slide3.xml><?xml version="1.0" encoding="utf-8"?>
+<file path=ppt/slides/slide4.xml><?xml version="1.0" encoding="utf-8"?>
 <p:sld xmlns:a="http://schemas.openxmlformats.org/drawingml/2006/main" xmlns:r="http://schemas.openxmlformats.org/officeDocument/2006/relationships" xmlns:p="http://schemas.openxmlformats.org/presentationml/2006/main">
   <p:cSld>
     <p:spTree>
@@ -10966,7 +11738,7 @@
           </p:nvPr>
         </p:nvGraphicFramePr>
         <p:xfrm>
-          <a:off x="2032000" y="719666"/>
+          <a:off x="3136106" y="2690550"/>
           <a:ext cx="8128000" cy="5418667"/>
         </p:xfrm>
         <a:graphic>
@@ -10991,7 +11763,7 @@
 <file path=ppt/theme/theme1.xml><?xml version="1.0" encoding="utf-8"?>
 <a:theme xmlns:a="http://schemas.openxmlformats.org/drawingml/2006/main" name="Office Theme">
   <a:themeElements>
-    <a:clrScheme name="Office">
+    <a:clrScheme name="Office Theme">
       <a:dk1>
         <a:sysClr val="windowText" lastClr="000000"/>
       </a:dk1>
@@ -11029,7 +11801,7 @@
         <a:srgbClr val="954F72"/>
       </a:folHlink>
     </a:clrScheme>
-    <a:fontScheme name="Office">
+    <a:fontScheme name="Office Theme">
       <a:majorFont>
         <a:latin typeface="Calibri Light" panose="020F0302020204030204"/>
         <a:ea typeface=""/>
@@ -11064,23 +11836,6 @@
         <a:font script="Viet" typeface="Times New Roman"/>
         <a:font script="Uigh" typeface="Microsoft Uighur"/>
         <a:font script="Geor" typeface="Sylfaen"/>
-        <a:font script="Armn" typeface="Arial"/>
-        <a:font script="Bugi" typeface="Leelawadee UI"/>
-        <a:font script="Bopo" typeface="Microsoft JhengHei"/>
-        <a:font script="Java" typeface="Javanese Text"/>
-        <a:font script="Lisu" typeface="Segoe UI"/>
-        <a:font script="Mymr" typeface="Myanmar Text"/>
-        <a:font script="Nkoo" typeface="Ebrima"/>
-        <a:font script="Olck" typeface="Nirmala UI"/>
-        <a:font script="Osma" typeface="Ebrima"/>
-        <a:font script="Phag" typeface="Phagspa"/>
-        <a:font script="Syrn" typeface="Estrangelo Edessa"/>
-        <a:font script="Syrj" typeface="Estrangelo Edessa"/>
-        <a:font script="Syre" typeface="Estrangelo Edessa"/>
-        <a:font script="Sora" typeface="Nirmala UI"/>
-        <a:font script="Tale" typeface="Microsoft Tai Le"/>
-        <a:font script="Talu" typeface="Microsoft New Tai Lue"/>
-        <a:font script="Tfng" typeface="Ebrima"/>
       </a:majorFont>
       <a:minorFont>
         <a:latin typeface="Calibri" panose="020F0502020204030204"/>
@@ -11116,26 +11871,9 @@
         <a:font script="Viet" typeface="Arial"/>
         <a:font script="Uigh" typeface="Microsoft Uighur"/>
         <a:font script="Geor" typeface="Sylfaen"/>
-        <a:font script="Armn" typeface="Arial"/>
-        <a:font script="Bugi" typeface="Leelawadee UI"/>
-        <a:font script="Bopo" typeface="Microsoft JhengHei"/>
-        <a:font script="Java" typeface="Javanese Text"/>
-        <a:font script="Lisu" typeface="Segoe UI"/>
-        <a:font script="Mymr" typeface="Myanmar Text"/>
-        <a:font script="Nkoo" typeface="Ebrima"/>
-        <a:font script="Olck" typeface="Nirmala UI"/>
-        <a:font script="Osma" typeface="Ebrima"/>
-        <a:font script="Phag" typeface="Phagspa"/>
-        <a:font script="Syrn" typeface="Estrangelo Edessa"/>
-        <a:font script="Syrj" typeface="Estrangelo Edessa"/>
-        <a:font script="Syre" typeface="Estrangelo Edessa"/>
-        <a:font script="Sora" typeface="Nirmala UI"/>
-        <a:font script="Tale" typeface="Microsoft Tai Le"/>
-        <a:font script="Talu" typeface="Microsoft New Tai Lue"/>
-        <a:font script="Tfng" typeface="Ebrima"/>
       </a:minorFont>
     </a:fontScheme>
-    <a:fmtScheme name="Office">
+    <a:fmtScheme name="Office Theme">
       <a:fillStyleLst>
         <a:solidFill>
           <a:schemeClr val="phClr"/>

</xml_diff>